<commit_message>
Adds algo and toy example
</commit_message>
<xml_diff>
--- a/docs/PAL.pptx
+++ b/docs/PAL.pptx
@@ -10,7 +10,10 @@
     <p:sldId id="271" r:id="rId4"/>
     <p:sldId id="272" r:id="rId5"/>
     <p:sldId id="273" r:id="rId6"/>
-    <p:sldId id="265" r:id="rId7"/>
+    <p:sldId id="274" r:id="rId7"/>
+    <p:sldId id="275" r:id="rId8"/>
+    <p:sldId id="276" r:id="rId9"/>
+    <p:sldId id="265" r:id="rId10"/>
   </p:sldIdLst>
   <p:sldSz cx="12192000" cy="6858000"/>
   <p:notesSz cx="6858000" cy="9144000"/>
@@ -119,6 +122,9 @@
             <p14:sldId id="271"/>
             <p14:sldId id="272"/>
             <p14:sldId id="273"/>
+            <p14:sldId id="274"/>
+            <p14:sldId id="275"/>
+            <p14:sldId id="276"/>
             <p14:sldId id="265"/>
           </p14:sldIdLst>
         </p14:section>
@@ -280,7 +286,7 @@
           <a:p>
             <a:fld id="{34C20EFA-4C52-49DC-A4ED-EB6E135ADB68}" type="datetimeFigureOut">
               <a:rPr lang="LID4096" smtClean="0"/>
-              <a:t>03/02/2025</a:t>
+              <a:t>03/03/2025</a:t>
             </a:fld>
             <a:endParaRPr lang="LID4096"/>
           </a:p>
@@ -480,7 +486,7 @@
           <a:p>
             <a:fld id="{34C20EFA-4C52-49DC-A4ED-EB6E135ADB68}" type="datetimeFigureOut">
               <a:rPr lang="LID4096" smtClean="0"/>
-              <a:t>03/02/2025</a:t>
+              <a:t>03/03/2025</a:t>
             </a:fld>
             <a:endParaRPr lang="LID4096"/>
           </a:p>
@@ -690,7 +696,7 @@
           <a:p>
             <a:fld id="{34C20EFA-4C52-49DC-A4ED-EB6E135ADB68}" type="datetimeFigureOut">
               <a:rPr lang="LID4096" smtClean="0"/>
-              <a:t>03/02/2025</a:t>
+              <a:t>03/03/2025</a:t>
             </a:fld>
             <a:endParaRPr lang="LID4096"/>
           </a:p>
@@ -890,7 +896,7 @@
           <a:p>
             <a:fld id="{34C20EFA-4C52-49DC-A4ED-EB6E135ADB68}" type="datetimeFigureOut">
               <a:rPr lang="LID4096" smtClean="0"/>
-              <a:t>03/02/2025</a:t>
+              <a:t>03/03/2025</a:t>
             </a:fld>
             <a:endParaRPr lang="LID4096"/>
           </a:p>
@@ -1166,7 +1172,7 @@
           <a:p>
             <a:fld id="{34C20EFA-4C52-49DC-A4ED-EB6E135ADB68}" type="datetimeFigureOut">
               <a:rPr lang="LID4096" smtClean="0"/>
-              <a:t>03/02/2025</a:t>
+              <a:t>03/03/2025</a:t>
             </a:fld>
             <a:endParaRPr lang="LID4096"/>
           </a:p>
@@ -1434,7 +1440,7 @@
           <a:p>
             <a:fld id="{34C20EFA-4C52-49DC-A4ED-EB6E135ADB68}" type="datetimeFigureOut">
               <a:rPr lang="LID4096" smtClean="0"/>
-              <a:t>03/02/2025</a:t>
+              <a:t>03/03/2025</a:t>
             </a:fld>
             <a:endParaRPr lang="LID4096"/>
           </a:p>
@@ -1849,7 +1855,7 @@
           <a:p>
             <a:fld id="{34C20EFA-4C52-49DC-A4ED-EB6E135ADB68}" type="datetimeFigureOut">
               <a:rPr lang="LID4096" smtClean="0"/>
-              <a:t>03/02/2025</a:t>
+              <a:t>03/03/2025</a:t>
             </a:fld>
             <a:endParaRPr lang="LID4096"/>
           </a:p>
@@ -1991,7 +1997,7 @@
           <a:p>
             <a:fld id="{34C20EFA-4C52-49DC-A4ED-EB6E135ADB68}" type="datetimeFigureOut">
               <a:rPr lang="LID4096" smtClean="0"/>
-              <a:t>03/02/2025</a:t>
+              <a:t>03/03/2025</a:t>
             </a:fld>
             <a:endParaRPr lang="LID4096"/>
           </a:p>
@@ -2104,7 +2110,7 @@
           <a:p>
             <a:fld id="{34C20EFA-4C52-49DC-A4ED-EB6E135ADB68}" type="datetimeFigureOut">
               <a:rPr lang="LID4096" smtClean="0"/>
-              <a:t>03/02/2025</a:t>
+              <a:t>03/03/2025</a:t>
             </a:fld>
             <a:endParaRPr lang="LID4096"/>
           </a:p>
@@ -2417,7 +2423,7 @@
           <a:p>
             <a:fld id="{34C20EFA-4C52-49DC-A4ED-EB6E135ADB68}" type="datetimeFigureOut">
               <a:rPr lang="LID4096" smtClean="0"/>
-              <a:t>03/02/2025</a:t>
+              <a:t>03/03/2025</a:t>
             </a:fld>
             <a:endParaRPr lang="LID4096"/>
           </a:p>
@@ -2706,7 +2712,7 @@
           <a:p>
             <a:fld id="{34C20EFA-4C52-49DC-A4ED-EB6E135ADB68}" type="datetimeFigureOut">
               <a:rPr lang="LID4096" smtClean="0"/>
-              <a:t>03/02/2025</a:t>
+              <a:t>03/03/2025</a:t>
             </a:fld>
             <a:endParaRPr lang="LID4096"/>
           </a:p>
@@ -2949,7 +2955,7 @@
           <a:p>
             <a:fld id="{34C20EFA-4C52-49DC-A4ED-EB6E135ADB68}" type="datetimeFigureOut">
               <a:rPr lang="LID4096" smtClean="0"/>
-              <a:t>03/02/2025</a:t>
+              <a:t>03/03/2025</a:t>
             </a:fld>
             <a:endParaRPr lang="LID4096"/>
           </a:p>
@@ -8932,7 +8938,7 @@
           <a:p>
             <a:r>
               <a:rPr lang="en-US" dirty="0"/>
-              <a:t>PAL 16L8</a:t>
+              <a:t>Reading PAL 16L8</a:t>
             </a:r>
             <a:endParaRPr lang="en-SI" dirty="0"/>
           </a:p>
@@ -8968,13 +8974,6 @@
           <a:p>
             <a:r>
               <a:rPr lang="en-US" dirty="0"/>
-              <a:t>Reading</a:t>
-            </a:r>
-          </a:p>
-          <a:p>
-            <a:pPr lvl="1"/>
-            <a:r>
-              <a:rPr lang="en-US" dirty="0"/>
               <a:t>Create initial set of all possible inputs: </a:t>
             </a:r>
             <a:br>
@@ -8994,28 +8993,27 @@
             </a:r>
           </a:p>
           <a:p>
-            <a:pPr lvl="1"/>
             <a:r>
               <a:rPr lang="en-US" dirty="0"/>
               <a:t>For each input…</a:t>
             </a:r>
           </a:p>
           <a:p>
-            <a:pPr lvl="2"/>
+            <a:pPr lvl="1"/>
             <a:r>
               <a:rPr lang="en-US" dirty="0"/>
               <a:t>Note down the outputs</a:t>
             </a:r>
           </a:p>
           <a:p>
-            <a:pPr lvl="2"/>
+            <a:pPr lvl="1"/>
             <a:r>
               <a:rPr lang="en-US" dirty="0"/>
               <a:t>Check every I/O pin if it is in HI-Z</a:t>
             </a:r>
           </a:p>
           <a:p>
-            <a:pPr lvl="2"/>
+            <a:pPr lvl="1"/>
             <a:r>
               <a:rPr lang="en-US" dirty="0"/>
               <a:t>If HI-Z states are found, add additional inputs into the set of all possible inputs</a:t>
@@ -9190,7 +9188,7 @@
                                         <p:tgtEl>
                                           <p:spTgt spid="3">
                                             <p:txEl>
-                                              <p:pRg st="7" end="7"/>
+                                              <p:pRg st="6" end="6"/>
                                             </p:txEl>
                                           </p:spTgt>
                                         </p:tgtEl>
@@ -9221,7 +9219,7 @@
                                         <p:tgtEl>
                                           <p:spTgt spid="3">
                                             <p:txEl>
-                                              <p:pRg st="8" end="8"/>
+                                              <p:pRg st="7" end="7"/>
                                             </p:txEl>
                                           </p:spTgt>
                                         </p:tgtEl>
@@ -9270,7 +9268,7 @@
                                         <p:tgtEl>
                                           <p:spTgt spid="3">
                                             <p:txEl>
-                                              <p:pRg st="9" end="9"/>
+                                              <p:pRg st="8" end="8"/>
                                             </p:txEl>
                                           </p:spTgt>
                                         </p:tgtEl>
@@ -9438,7 +9436,7 @@
             <a:pPr lvl="1"/>
             <a:r>
               <a:rPr lang="en-US" dirty="0"/>
-              <a:t>Register value on clock pulse</a:t>
+              <a:t>Store value on clock pulse</a:t>
             </a:r>
           </a:p>
           <a:p>
@@ -13516,6 +13514,1365 @@
   <p:cSld>
     <p:spTree>
       <p:nvGrpSpPr>
+        <p:cNvPr id="1" name="">
+          <a:extLst>
+            <a:ext uri="{FF2B5EF4-FFF2-40B4-BE49-F238E27FC236}">
+              <a16:creationId xmlns:a16="http://schemas.microsoft.com/office/drawing/2014/main" id="{15302EED-CC20-3FCA-83C8-C1BA459D90DE}"/>
+            </a:ext>
+          </a:extLst>
+        </p:cNvPr>
+        <p:cNvGrpSpPr/>
+        <p:nvPr/>
+      </p:nvGrpSpPr>
+      <p:grpSpPr>
+        <a:xfrm>
+          <a:off x="0" y="0"/>
+          <a:ext cx="0" cy="0"/>
+          <a:chOff x="0" y="0"/>
+          <a:chExt cx="0" cy="0"/>
+        </a:xfrm>
+      </p:grpSpPr>
+      <p:sp>
+        <p:nvSpPr>
+          <p:cNvPr id="2" name="Title 1">
+            <a:extLst>
+              <a:ext uri="{FF2B5EF4-FFF2-40B4-BE49-F238E27FC236}">
+                <a16:creationId xmlns:a16="http://schemas.microsoft.com/office/drawing/2014/main" id="{E2C4C521-98D5-0106-6988-1FA9DD19AF91}"/>
+              </a:ext>
+            </a:extLst>
+          </p:cNvPr>
+          <p:cNvSpPr>
+            <a:spLocks noGrp="1"/>
+          </p:cNvSpPr>
+          <p:nvPr>
+            <p:ph type="title"/>
+          </p:nvPr>
+        </p:nvSpPr>
+        <p:spPr/>
+        <p:txBody>
+          <a:bodyPr/>
+          <a:lstStyle/>
+          <a:p>
+            <a:r>
+              <a:rPr lang="en-US" dirty="0"/>
+              <a:t>Reading PAL 16R4</a:t>
+            </a:r>
+            <a:endParaRPr lang="en-SI" dirty="0"/>
+          </a:p>
+        </p:txBody>
+      </p:sp>
+      <p:sp>
+        <p:nvSpPr>
+          <p:cNvPr id="3" name="Content Placeholder 2">
+            <a:extLst>
+              <a:ext uri="{FF2B5EF4-FFF2-40B4-BE49-F238E27FC236}">
+                <a16:creationId xmlns:a16="http://schemas.microsoft.com/office/drawing/2014/main" id="{0F65128C-19C0-ADE9-AD69-8B3F279826C7}"/>
+              </a:ext>
+            </a:extLst>
+          </p:cNvPr>
+          <p:cNvSpPr>
+            <a:spLocks noGrp="1"/>
+          </p:cNvSpPr>
+          <p:nvPr>
+            <p:ph idx="1"/>
+          </p:nvPr>
+        </p:nvSpPr>
+        <p:spPr>
+          <a:xfrm>
+            <a:off x="838200" y="1825624"/>
+            <a:ext cx="6016167" cy="5032375"/>
+          </a:xfrm>
+        </p:spPr>
+        <p:txBody>
+          <a:bodyPr>
+            <a:normAutofit/>
+          </a:bodyPr>
+          <a:lstStyle/>
+          <a:p>
+            <a:r>
+              <a:rPr lang="en-US" dirty="0"/>
+              <a:t>State graph</a:t>
+            </a:r>
+          </a:p>
+          <a:p>
+            <a:pPr lvl="1"/>
+            <a:r>
+              <a:rPr lang="en-US" dirty="0"/>
+              <a:t>State: 4-bit state, register outputs</a:t>
+            </a:r>
+          </a:p>
+          <a:p>
+            <a:pPr lvl="1"/>
+            <a:r>
+              <a:rPr lang="en-US" dirty="0"/>
+              <a:t>Node</a:t>
+            </a:r>
+          </a:p>
+          <a:p>
+            <a:pPr lvl="2"/>
+            <a:r>
+              <a:rPr lang="en-US" dirty="0">
+                <a:solidFill>
+                  <a:srgbClr val="FF0000"/>
+                </a:solidFill>
+              </a:rPr>
+              <a:t>State</a:t>
+            </a:r>
+            <a:r>
+              <a:rPr lang="en-US" dirty="0"/>
+              <a:t> – 4-bit state (register outputs)</a:t>
+            </a:r>
+          </a:p>
+          <a:p>
+            <a:pPr lvl="2"/>
+            <a:r>
+              <a:rPr lang="en-US" dirty="0">
+                <a:solidFill>
+                  <a:srgbClr val="FF0000"/>
+                </a:solidFill>
+              </a:rPr>
+              <a:t>Mappings</a:t>
+            </a:r>
+            <a:r>
+              <a:rPr lang="en-US" dirty="0"/>
+              <a:t> – All possible input-to-output mappings (registers are ignored)</a:t>
+            </a:r>
+          </a:p>
+          <a:p>
+            <a:pPr lvl="2"/>
+            <a:r>
+              <a:rPr lang="en-US" dirty="0">
+                <a:solidFill>
+                  <a:srgbClr val="FF0000"/>
+                </a:solidFill>
+              </a:rPr>
+              <a:t>Inputs</a:t>
+            </a:r>
+            <a:r>
+              <a:rPr lang="en-US" dirty="0"/>
+              <a:t> – Queue of all possible inputs</a:t>
+            </a:r>
+          </a:p>
+          <a:p>
+            <a:pPr lvl="2"/>
+            <a:r>
+              <a:rPr lang="en-US" dirty="0" err="1">
+                <a:solidFill>
+                  <a:srgbClr val="FF0000"/>
+                </a:solidFill>
+              </a:rPr>
+              <a:t>Outlinks</a:t>
+            </a:r>
+            <a:r>
+              <a:rPr lang="en-US" dirty="0"/>
+              <a:t> – Pointers to other states in the state graph</a:t>
+            </a:r>
+          </a:p>
+        </p:txBody>
+      </p:sp>
+      <p:pic>
+        <p:nvPicPr>
+          <p:cNvPr id="6" name="Picture 5">
+            <a:extLst>
+              <a:ext uri="{FF2B5EF4-FFF2-40B4-BE49-F238E27FC236}">
+                <a16:creationId xmlns:a16="http://schemas.microsoft.com/office/drawing/2014/main" id="{9C3B78E0-3671-4811-A342-2C7C5B47BDDB}"/>
+              </a:ext>
+            </a:extLst>
+          </p:cNvPr>
+          <p:cNvPicPr>
+            <a:picLocks noChangeAspect="1"/>
+          </p:cNvPicPr>
+          <p:nvPr/>
+        </p:nvPicPr>
+        <p:blipFill>
+          <a:blip r:embed="rId2"/>
+          <a:stretch>
+            <a:fillRect/>
+          </a:stretch>
+        </p:blipFill>
+        <p:spPr>
+          <a:xfrm>
+            <a:off x="6698372" y="-1"/>
+            <a:ext cx="5493628" cy="6858000"/>
+          </a:xfrm>
+          <a:prstGeom prst="rect">
+            <a:avLst/>
+          </a:prstGeom>
+        </p:spPr>
+      </p:pic>
+    </p:spTree>
+    <p:extLst>
+      <p:ext uri="{BB962C8B-B14F-4D97-AF65-F5344CB8AC3E}">
+        <p14:creationId xmlns:p14="http://schemas.microsoft.com/office/powerpoint/2010/main" val="2882918676"/>
+      </p:ext>
+    </p:extLst>
+  </p:cSld>
+  <p:clrMapOvr>
+    <a:masterClrMapping/>
+  </p:clrMapOvr>
+  <p:timing>
+    <p:tnLst>
+      <p:par>
+        <p:cTn id="1" dur="indefinite" restart="never" nodeType="tmRoot">
+          <p:childTnLst>
+            <p:seq concurrent="1" nextAc="seek">
+              <p:cTn id="2" dur="indefinite" nodeType="mainSeq">
+                <p:childTnLst>
+                  <p:par>
+                    <p:cTn id="3" fill="hold">
+                      <p:stCondLst>
+                        <p:cond delay="indefinite"/>
+                      </p:stCondLst>
+                      <p:childTnLst>
+                        <p:par>
+                          <p:cTn id="4" fill="hold">
+                            <p:stCondLst>
+                              <p:cond delay="0"/>
+                            </p:stCondLst>
+                            <p:childTnLst>
+                              <p:par>
+                                <p:cTn id="5" presetID="1" presetClass="entr" presetSubtype="0" fill="hold" nodeType="clickEffect">
+                                  <p:stCondLst>
+                                    <p:cond delay="0"/>
+                                  </p:stCondLst>
+                                  <p:childTnLst>
+                                    <p:set>
+                                      <p:cBhvr>
+                                        <p:cTn id="6" dur="1" fill="hold">
+                                          <p:stCondLst>
+                                            <p:cond delay="0"/>
+                                          </p:stCondLst>
+                                        </p:cTn>
+                                        <p:tgtEl>
+                                          <p:spTgt spid="3">
+                                            <p:txEl>
+                                              <p:pRg st="2" end="2"/>
+                                            </p:txEl>
+                                          </p:spTgt>
+                                        </p:tgtEl>
+                                        <p:attrNameLst>
+                                          <p:attrName>style.visibility</p:attrName>
+                                        </p:attrNameLst>
+                                      </p:cBhvr>
+                                      <p:to>
+                                        <p:strVal val="visible"/>
+                                      </p:to>
+                                    </p:set>
+                                  </p:childTnLst>
+                                </p:cTn>
+                              </p:par>
+                              <p:par>
+                                <p:cTn id="7" presetID="1" presetClass="entr" presetSubtype="0" fill="hold" nodeType="withEffect">
+                                  <p:stCondLst>
+                                    <p:cond delay="0"/>
+                                  </p:stCondLst>
+                                  <p:childTnLst>
+                                    <p:set>
+                                      <p:cBhvr>
+                                        <p:cTn id="8" dur="1" fill="hold">
+                                          <p:stCondLst>
+                                            <p:cond delay="0"/>
+                                          </p:stCondLst>
+                                        </p:cTn>
+                                        <p:tgtEl>
+                                          <p:spTgt spid="3">
+                                            <p:txEl>
+                                              <p:pRg st="3" end="3"/>
+                                            </p:txEl>
+                                          </p:spTgt>
+                                        </p:tgtEl>
+                                        <p:attrNameLst>
+                                          <p:attrName>style.visibility</p:attrName>
+                                        </p:attrNameLst>
+                                      </p:cBhvr>
+                                      <p:to>
+                                        <p:strVal val="visible"/>
+                                      </p:to>
+                                    </p:set>
+                                  </p:childTnLst>
+                                </p:cTn>
+                              </p:par>
+                              <p:par>
+                                <p:cTn id="9" presetID="1" presetClass="entr" presetSubtype="0" fill="hold" nodeType="withEffect">
+                                  <p:stCondLst>
+                                    <p:cond delay="0"/>
+                                  </p:stCondLst>
+                                  <p:childTnLst>
+                                    <p:set>
+                                      <p:cBhvr>
+                                        <p:cTn id="10" dur="1" fill="hold">
+                                          <p:stCondLst>
+                                            <p:cond delay="0"/>
+                                          </p:stCondLst>
+                                        </p:cTn>
+                                        <p:tgtEl>
+                                          <p:spTgt spid="3">
+                                            <p:txEl>
+                                              <p:pRg st="4" end="4"/>
+                                            </p:txEl>
+                                          </p:spTgt>
+                                        </p:tgtEl>
+                                        <p:attrNameLst>
+                                          <p:attrName>style.visibility</p:attrName>
+                                        </p:attrNameLst>
+                                      </p:cBhvr>
+                                      <p:to>
+                                        <p:strVal val="visible"/>
+                                      </p:to>
+                                    </p:set>
+                                  </p:childTnLst>
+                                </p:cTn>
+                              </p:par>
+                              <p:par>
+                                <p:cTn id="11" presetID="1" presetClass="entr" presetSubtype="0" fill="hold" nodeType="withEffect">
+                                  <p:stCondLst>
+                                    <p:cond delay="0"/>
+                                  </p:stCondLst>
+                                  <p:childTnLst>
+                                    <p:set>
+                                      <p:cBhvr>
+                                        <p:cTn id="12" dur="1" fill="hold">
+                                          <p:stCondLst>
+                                            <p:cond delay="0"/>
+                                          </p:stCondLst>
+                                        </p:cTn>
+                                        <p:tgtEl>
+                                          <p:spTgt spid="3">
+                                            <p:txEl>
+                                              <p:pRg st="5" end="5"/>
+                                            </p:txEl>
+                                          </p:spTgt>
+                                        </p:tgtEl>
+                                        <p:attrNameLst>
+                                          <p:attrName>style.visibility</p:attrName>
+                                        </p:attrNameLst>
+                                      </p:cBhvr>
+                                      <p:to>
+                                        <p:strVal val="visible"/>
+                                      </p:to>
+                                    </p:set>
+                                  </p:childTnLst>
+                                </p:cTn>
+                              </p:par>
+                              <p:par>
+                                <p:cTn id="13" presetID="1" presetClass="entr" presetSubtype="0" fill="hold" nodeType="withEffect">
+                                  <p:stCondLst>
+                                    <p:cond delay="0"/>
+                                  </p:stCondLst>
+                                  <p:childTnLst>
+                                    <p:set>
+                                      <p:cBhvr>
+                                        <p:cTn id="14" dur="1" fill="hold">
+                                          <p:stCondLst>
+                                            <p:cond delay="0"/>
+                                          </p:stCondLst>
+                                        </p:cTn>
+                                        <p:tgtEl>
+                                          <p:spTgt spid="3">
+                                            <p:txEl>
+                                              <p:pRg st="6" end="6"/>
+                                            </p:txEl>
+                                          </p:spTgt>
+                                        </p:tgtEl>
+                                        <p:attrNameLst>
+                                          <p:attrName>style.visibility</p:attrName>
+                                        </p:attrNameLst>
+                                      </p:cBhvr>
+                                      <p:to>
+                                        <p:strVal val="visible"/>
+                                      </p:to>
+                                    </p:set>
+                                  </p:childTnLst>
+                                </p:cTn>
+                              </p:par>
+                            </p:childTnLst>
+                          </p:cTn>
+                        </p:par>
+                      </p:childTnLst>
+                    </p:cTn>
+                  </p:par>
+                </p:childTnLst>
+              </p:cTn>
+              <p:prevCondLst>
+                <p:cond evt="onPrev" delay="0">
+                  <p:tgtEl>
+                    <p:sldTgt/>
+                  </p:tgtEl>
+                </p:cond>
+              </p:prevCondLst>
+              <p:nextCondLst>
+                <p:cond evt="onNext" delay="0">
+                  <p:tgtEl>
+                    <p:sldTgt/>
+                  </p:tgtEl>
+                </p:cond>
+              </p:nextCondLst>
+            </p:seq>
+          </p:childTnLst>
+        </p:cTn>
+      </p:par>
+    </p:tnLst>
+  </p:timing>
+</p:sld>
+</file>
+
+<file path=ppt/slides/slide7.xml><?xml version="1.0" encoding="utf-8"?>
+<p:sld xmlns:a="http://schemas.openxmlformats.org/drawingml/2006/main" xmlns:r="http://schemas.openxmlformats.org/officeDocument/2006/relationships" xmlns:p="http://schemas.openxmlformats.org/presentationml/2006/main">
+  <p:cSld>
+    <p:spTree>
+      <p:nvGrpSpPr>
+        <p:cNvPr id="1" name="">
+          <a:extLst>
+            <a:ext uri="{FF2B5EF4-FFF2-40B4-BE49-F238E27FC236}">
+              <a16:creationId xmlns:a16="http://schemas.microsoft.com/office/drawing/2014/main" id="{3A9B8609-B7D4-D7D3-7AE0-367A7728F73C}"/>
+            </a:ext>
+          </a:extLst>
+        </p:cNvPr>
+        <p:cNvGrpSpPr/>
+        <p:nvPr/>
+      </p:nvGrpSpPr>
+      <p:grpSpPr>
+        <a:xfrm>
+          <a:off x="0" y="0"/>
+          <a:ext cx="0" cy="0"/>
+          <a:chOff x="0" y="0"/>
+          <a:chExt cx="0" cy="0"/>
+        </a:xfrm>
+      </p:grpSpPr>
+      <p:sp>
+        <p:nvSpPr>
+          <p:cNvPr id="2" name="Title 1">
+            <a:extLst>
+              <a:ext uri="{FF2B5EF4-FFF2-40B4-BE49-F238E27FC236}">
+                <a16:creationId xmlns:a16="http://schemas.microsoft.com/office/drawing/2014/main" id="{FECBD3FE-8524-A558-ACF8-0611012858C1}"/>
+              </a:ext>
+            </a:extLst>
+          </p:cNvPr>
+          <p:cNvSpPr>
+            <a:spLocks noGrp="1"/>
+          </p:cNvSpPr>
+          <p:nvPr>
+            <p:ph type="title"/>
+          </p:nvPr>
+        </p:nvSpPr>
+        <p:spPr/>
+        <p:txBody>
+          <a:bodyPr/>
+          <a:lstStyle/>
+          <a:p>
+            <a:r>
+              <a:rPr lang="en-US" dirty="0"/>
+              <a:t>Reading PAL 16R4</a:t>
+            </a:r>
+            <a:endParaRPr lang="en-SI" dirty="0"/>
+          </a:p>
+        </p:txBody>
+      </p:sp>
+      <p:sp>
+        <p:nvSpPr>
+          <p:cNvPr id="3" name="Content Placeholder 2">
+            <a:extLst>
+              <a:ext uri="{FF2B5EF4-FFF2-40B4-BE49-F238E27FC236}">
+                <a16:creationId xmlns:a16="http://schemas.microsoft.com/office/drawing/2014/main" id="{124F1340-2FB0-A764-FE81-3A352BEE5665}"/>
+              </a:ext>
+            </a:extLst>
+          </p:cNvPr>
+          <p:cNvSpPr>
+            <a:spLocks noGrp="1"/>
+          </p:cNvSpPr>
+          <p:nvPr>
+            <p:ph idx="1"/>
+          </p:nvPr>
+        </p:nvSpPr>
+        <p:spPr>
+          <a:xfrm>
+            <a:off x="838200" y="1825624"/>
+            <a:ext cx="6016167" cy="5032375"/>
+          </a:xfrm>
+        </p:spPr>
+        <p:txBody>
+          <a:bodyPr>
+            <a:normAutofit/>
+          </a:bodyPr>
+          <a:lstStyle/>
+          <a:p>
+            <a:r>
+              <a:rPr lang="en-US" dirty="0" err="1"/>
+              <a:t>Get_or_create_node</a:t>
+            </a:r>
+            <a:r>
+              <a:rPr lang="en-US" dirty="0"/>
+              <a:t>(state)</a:t>
+            </a:r>
+          </a:p>
+          <a:p>
+            <a:pPr lvl="1"/>
+            <a:r>
+              <a:rPr lang="en-US" dirty="0"/>
+              <a:t>Create new node (= explore new state)</a:t>
+            </a:r>
+          </a:p>
+          <a:p>
+            <a:pPr lvl="2"/>
+            <a:r>
+              <a:rPr lang="en-US" dirty="0"/>
+              <a:t>Create initial set of all possible inputs: </a:t>
+            </a:r>
+            <a:br>
+              <a:rPr lang="en-US" dirty="0"/>
+            </a:br>
+            <a:r>
+              <a:rPr lang="en-US" dirty="0"/>
+              <a:t>0 .. 2</a:t>
+            </a:r>
+            <a:r>
+              <a:rPr lang="en-US" baseline="30000" dirty="0">
+                <a:solidFill>
+                  <a:srgbClr val="FF0000"/>
+                </a:solidFill>
+              </a:rPr>
+              <a:t>8</a:t>
+            </a:r>
+            <a:r>
+              <a:rPr lang="en-US" dirty="0"/>
+              <a:t> – 1 </a:t>
+            </a:r>
+          </a:p>
+          <a:p>
+            <a:pPr lvl="2"/>
+            <a:r>
+              <a:rPr lang="en-US" dirty="0"/>
+              <a:t>For each input… </a:t>
+            </a:r>
+            <a:r>
+              <a:rPr lang="en-US" dirty="0">
+                <a:solidFill>
+                  <a:srgbClr val="FF0000"/>
+                </a:solidFill>
+              </a:rPr>
+              <a:t>(no clock pulse!)</a:t>
+            </a:r>
+          </a:p>
+          <a:p>
+            <a:pPr lvl="3"/>
+            <a:r>
+              <a:rPr lang="en-US" dirty="0"/>
+              <a:t>Note down the outputs </a:t>
+            </a:r>
+            <a:r>
+              <a:rPr lang="en-US" dirty="0">
+                <a:solidFill>
+                  <a:srgbClr val="FF0000"/>
+                </a:solidFill>
+              </a:rPr>
+              <a:t>(attach these to </a:t>
+            </a:r>
+            <a:r>
+              <a:rPr lang="en-US" dirty="0" err="1">
+                <a:solidFill>
+                  <a:srgbClr val="FF0000"/>
+                </a:solidFill>
+              </a:rPr>
+              <a:t>node.mappings</a:t>
+            </a:r>
+            <a:r>
+              <a:rPr lang="en-US" dirty="0">
+                <a:solidFill>
+                  <a:srgbClr val="FF0000"/>
+                </a:solidFill>
+              </a:rPr>
+              <a:t>)</a:t>
+            </a:r>
+          </a:p>
+          <a:p>
+            <a:pPr lvl="3"/>
+            <a:r>
+              <a:rPr lang="en-US" dirty="0"/>
+              <a:t>Check every I/O pin if it is in HI-Z</a:t>
+            </a:r>
+          </a:p>
+          <a:p>
+            <a:pPr lvl="3"/>
+            <a:r>
+              <a:rPr lang="en-US" dirty="0"/>
+              <a:t>If HI-Z states are found, add additional inputs into the set of all possible inputs</a:t>
+            </a:r>
+          </a:p>
+          <a:p>
+            <a:pPr lvl="2"/>
+            <a:r>
+              <a:rPr lang="en-US" dirty="0">
+                <a:solidFill>
+                  <a:srgbClr val="FF0000"/>
+                </a:solidFill>
+              </a:rPr>
+              <a:t>Create a queue of all the inputs that were mapped (attach it to </a:t>
+            </a:r>
+            <a:r>
+              <a:rPr lang="en-US" dirty="0" err="1">
+                <a:solidFill>
+                  <a:srgbClr val="FF0000"/>
+                </a:solidFill>
+              </a:rPr>
+              <a:t>node.inputs</a:t>
+            </a:r>
+            <a:r>
+              <a:rPr lang="en-US" dirty="0">
+                <a:solidFill>
+                  <a:srgbClr val="FF0000"/>
+                </a:solidFill>
+              </a:rPr>
+              <a:t>)</a:t>
+            </a:r>
+          </a:p>
+          <a:p>
+            <a:pPr lvl="1"/>
+            <a:r>
+              <a:rPr lang="en-US" dirty="0"/>
+              <a:t>Get existing node</a:t>
+            </a:r>
+          </a:p>
+          <a:p>
+            <a:pPr lvl="2"/>
+            <a:r>
+              <a:rPr lang="en-US" dirty="0"/>
+              <a:t>Simply fetch the node object corresponding to </a:t>
+            </a:r>
+            <a:r>
+              <a:rPr lang="en-US" i="1" dirty="0"/>
+              <a:t>state</a:t>
+            </a:r>
+          </a:p>
+        </p:txBody>
+      </p:sp>
+      <p:pic>
+        <p:nvPicPr>
+          <p:cNvPr id="6" name="Picture 5">
+            <a:extLst>
+              <a:ext uri="{FF2B5EF4-FFF2-40B4-BE49-F238E27FC236}">
+                <a16:creationId xmlns:a16="http://schemas.microsoft.com/office/drawing/2014/main" id="{9D63A90B-36C9-F321-AD07-B529D8847B34}"/>
+              </a:ext>
+            </a:extLst>
+          </p:cNvPr>
+          <p:cNvPicPr>
+            <a:picLocks noChangeAspect="1"/>
+          </p:cNvPicPr>
+          <p:nvPr/>
+        </p:nvPicPr>
+        <p:blipFill>
+          <a:blip r:embed="rId2"/>
+          <a:stretch>
+            <a:fillRect/>
+          </a:stretch>
+        </p:blipFill>
+        <p:spPr>
+          <a:xfrm>
+            <a:off x="6698372" y="-1"/>
+            <a:ext cx="5493628" cy="6858000"/>
+          </a:xfrm>
+          <a:prstGeom prst="rect">
+            <a:avLst/>
+          </a:prstGeom>
+        </p:spPr>
+      </p:pic>
+      <p:grpSp>
+        <p:nvGrpSpPr>
+          <p:cNvPr id="7" name="Group 6">
+            <a:extLst>
+              <a:ext uri="{FF2B5EF4-FFF2-40B4-BE49-F238E27FC236}">
+                <a16:creationId xmlns:a16="http://schemas.microsoft.com/office/drawing/2014/main" id="{9D32D6C0-5956-FB25-0D6C-6FF6FE648D35}"/>
+              </a:ext>
+            </a:extLst>
+          </p:cNvPr>
+          <p:cNvGrpSpPr/>
+          <p:nvPr/>
+        </p:nvGrpSpPr>
+        <p:grpSpPr>
+          <a:xfrm>
+            <a:off x="223114" y="2716646"/>
+            <a:ext cx="1448667" cy="2389908"/>
+            <a:chOff x="223114" y="2716646"/>
+            <a:chExt cx="1448667" cy="2389908"/>
+          </a:xfrm>
+        </p:grpSpPr>
+        <p:sp>
+          <p:nvSpPr>
+            <p:cNvPr id="4" name="Content Placeholder 2">
+              <a:extLst>
+                <a:ext uri="{FF2B5EF4-FFF2-40B4-BE49-F238E27FC236}">
+                  <a16:creationId xmlns:a16="http://schemas.microsoft.com/office/drawing/2014/main" id="{62AC1784-A361-540D-227B-F9FDD2AE04CD}"/>
+                </a:ext>
+              </a:extLst>
+            </p:cNvPr>
+            <p:cNvSpPr txBox="1">
+              <a:spLocks/>
+            </p:cNvSpPr>
+            <p:nvPr/>
+          </p:nvSpPr>
+          <p:spPr>
+            <a:xfrm rot="16200000">
+              <a:off x="-515361" y="3455121"/>
+              <a:ext cx="2389908" cy="912958"/>
+            </a:xfrm>
+            <a:prstGeom prst="rect">
+              <a:avLst/>
+            </a:prstGeom>
+          </p:spPr>
+          <p:txBody>
+            <a:bodyPr vert="horz" lIns="91440" tIns="45720" rIns="91440" bIns="45720" rtlCol="0">
+              <a:normAutofit/>
+            </a:bodyPr>
+            <a:lstStyle>
+              <a:lvl1pPr marL="228600" indent="-228600" algn="l" defTabSz="914400" rtl="0" eaLnBrk="1" latinLnBrk="0" hangingPunct="1">
+                <a:lnSpc>
+                  <a:spcPct val="90000"/>
+                </a:lnSpc>
+                <a:spcBef>
+                  <a:spcPts val="1000"/>
+                </a:spcBef>
+                <a:buFont typeface="Arial" panose="020B0604020202020204" pitchFamily="34" charset="0"/>
+                <a:buChar char="•"/>
+                <a:defRPr sz="2800" kern="1200">
+                  <a:solidFill>
+                    <a:schemeClr val="tx1"/>
+                  </a:solidFill>
+                  <a:latin typeface="+mn-lt"/>
+                  <a:ea typeface="+mn-ea"/>
+                  <a:cs typeface="+mn-cs"/>
+                </a:defRPr>
+              </a:lvl1pPr>
+              <a:lvl2pPr marL="685800" indent="-228600" algn="l" defTabSz="914400" rtl="0" eaLnBrk="1" latinLnBrk="0" hangingPunct="1">
+                <a:lnSpc>
+                  <a:spcPct val="90000"/>
+                </a:lnSpc>
+                <a:spcBef>
+                  <a:spcPts val="500"/>
+                </a:spcBef>
+                <a:buFont typeface="Arial" panose="020B0604020202020204" pitchFamily="34" charset="0"/>
+                <a:buChar char="•"/>
+                <a:defRPr sz="2400" kern="1200">
+                  <a:solidFill>
+                    <a:schemeClr val="tx1"/>
+                  </a:solidFill>
+                  <a:latin typeface="+mn-lt"/>
+                  <a:ea typeface="+mn-ea"/>
+                  <a:cs typeface="+mn-cs"/>
+                </a:defRPr>
+              </a:lvl2pPr>
+              <a:lvl3pPr marL="1143000" indent="-228600" algn="l" defTabSz="914400" rtl="0" eaLnBrk="1" latinLnBrk="0" hangingPunct="1">
+                <a:lnSpc>
+                  <a:spcPct val="90000"/>
+                </a:lnSpc>
+                <a:spcBef>
+                  <a:spcPts val="500"/>
+                </a:spcBef>
+                <a:buFont typeface="Arial" panose="020B0604020202020204" pitchFamily="34" charset="0"/>
+                <a:buChar char="•"/>
+                <a:defRPr sz="2000" kern="1200">
+                  <a:solidFill>
+                    <a:schemeClr val="tx1"/>
+                  </a:solidFill>
+                  <a:latin typeface="+mn-lt"/>
+                  <a:ea typeface="+mn-ea"/>
+                  <a:cs typeface="+mn-cs"/>
+                </a:defRPr>
+              </a:lvl3pPr>
+              <a:lvl4pPr marL="1600200" indent="-228600" algn="l" defTabSz="914400" rtl="0" eaLnBrk="1" latinLnBrk="0" hangingPunct="1">
+                <a:lnSpc>
+                  <a:spcPct val="90000"/>
+                </a:lnSpc>
+                <a:spcBef>
+                  <a:spcPts val="500"/>
+                </a:spcBef>
+                <a:buFont typeface="Arial" panose="020B0604020202020204" pitchFamily="34" charset="0"/>
+                <a:buChar char="•"/>
+                <a:defRPr sz="1800" kern="1200">
+                  <a:solidFill>
+                    <a:schemeClr val="tx1"/>
+                  </a:solidFill>
+                  <a:latin typeface="+mn-lt"/>
+                  <a:ea typeface="+mn-ea"/>
+                  <a:cs typeface="+mn-cs"/>
+                </a:defRPr>
+              </a:lvl4pPr>
+              <a:lvl5pPr marL="2057400" indent="-228600" algn="l" defTabSz="914400" rtl="0" eaLnBrk="1" latinLnBrk="0" hangingPunct="1">
+                <a:lnSpc>
+                  <a:spcPct val="90000"/>
+                </a:lnSpc>
+                <a:spcBef>
+                  <a:spcPts val="500"/>
+                </a:spcBef>
+                <a:buFont typeface="Arial" panose="020B0604020202020204" pitchFamily="34" charset="0"/>
+                <a:buChar char="•"/>
+                <a:defRPr sz="1800" kern="1200">
+                  <a:solidFill>
+                    <a:schemeClr val="tx1"/>
+                  </a:solidFill>
+                  <a:latin typeface="+mn-lt"/>
+                  <a:ea typeface="+mn-ea"/>
+                  <a:cs typeface="+mn-cs"/>
+                </a:defRPr>
+              </a:lvl5pPr>
+              <a:lvl6pPr marL="2514600" indent="-228600" algn="l" defTabSz="914400" rtl="0" eaLnBrk="1" latinLnBrk="0" hangingPunct="1">
+                <a:lnSpc>
+                  <a:spcPct val="90000"/>
+                </a:lnSpc>
+                <a:spcBef>
+                  <a:spcPts val="500"/>
+                </a:spcBef>
+                <a:buFont typeface="Arial" panose="020B0604020202020204" pitchFamily="34" charset="0"/>
+                <a:buChar char="•"/>
+                <a:defRPr sz="1800" kern="1200">
+                  <a:solidFill>
+                    <a:schemeClr val="tx1"/>
+                  </a:solidFill>
+                  <a:latin typeface="+mn-lt"/>
+                  <a:ea typeface="+mn-ea"/>
+                  <a:cs typeface="+mn-cs"/>
+                </a:defRPr>
+              </a:lvl6pPr>
+              <a:lvl7pPr marL="2971800" indent="-228600" algn="l" defTabSz="914400" rtl="0" eaLnBrk="1" latinLnBrk="0" hangingPunct="1">
+                <a:lnSpc>
+                  <a:spcPct val="90000"/>
+                </a:lnSpc>
+                <a:spcBef>
+                  <a:spcPts val="500"/>
+                </a:spcBef>
+                <a:buFont typeface="Arial" panose="020B0604020202020204" pitchFamily="34" charset="0"/>
+                <a:buChar char="•"/>
+                <a:defRPr sz="1800" kern="1200">
+                  <a:solidFill>
+                    <a:schemeClr val="tx1"/>
+                  </a:solidFill>
+                  <a:latin typeface="+mn-lt"/>
+                  <a:ea typeface="+mn-ea"/>
+                  <a:cs typeface="+mn-cs"/>
+                </a:defRPr>
+              </a:lvl7pPr>
+              <a:lvl8pPr marL="3429000" indent="-228600" algn="l" defTabSz="914400" rtl="0" eaLnBrk="1" latinLnBrk="0" hangingPunct="1">
+                <a:lnSpc>
+                  <a:spcPct val="90000"/>
+                </a:lnSpc>
+                <a:spcBef>
+                  <a:spcPts val="500"/>
+                </a:spcBef>
+                <a:buFont typeface="Arial" panose="020B0604020202020204" pitchFamily="34" charset="0"/>
+                <a:buChar char="•"/>
+                <a:defRPr sz="1800" kern="1200">
+                  <a:solidFill>
+                    <a:schemeClr val="tx1"/>
+                  </a:solidFill>
+                  <a:latin typeface="+mn-lt"/>
+                  <a:ea typeface="+mn-ea"/>
+                  <a:cs typeface="+mn-cs"/>
+                </a:defRPr>
+              </a:lvl8pPr>
+              <a:lvl9pPr marL="3886200" indent="-228600" algn="l" defTabSz="914400" rtl="0" eaLnBrk="1" latinLnBrk="0" hangingPunct="1">
+                <a:lnSpc>
+                  <a:spcPct val="90000"/>
+                </a:lnSpc>
+                <a:spcBef>
+                  <a:spcPts val="500"/>
+                </a:spcBef>
+                <a:buFont typeface="Arial" panose="020B0604020202020204" pitchFamily="34" charset="0"/>
+                <a:buChar char="•"/>
+                <a:defRPr sz="1800" kern="1200">
+                  <a:solidFill>
+                    <a:schemeClr val="tx1"/>
+                  </a:solidFill>
+                  <a:latin typeface="+mn-lt"/>
+                  <a:ea typeface="+mn-ea"/>
+                  <a:cs typeface="+mn-cs"/>
+                </a:defRPr>
+              </a:lvl9pPr>
+            </a:lstStyle>
+            <a:p>
+              <a:pPr marL="0" indent="0" algn="ctr">
+                <a:buNone/>
+              </a:pPr>
+              <a:r>
+                <a:rPr lang="en-US" sz="2400" dirty="0">
+                  <a:solidFill>
+                    <a:sysClr val="windowText" lastClr="000000"/>
+                  </a:solidFill>
+                </a:rPr>
+                <a:t>Same as </a:t>
+              </a:r>
+              <a:br>
+                <a:rPr lang="en-US" sz="2400" dirty="0">
+                  <a:solidFill>
+                    <a:sysClr val="windowText" lastClr="000000"/>
+                  </a:solidFill>
+                </a:rPr>
+              </a:br>
+              <a:r>
+                <a:rPr lang="en-US" sz="2400" dirty="0">
+                  <a:solidFill>
+                    <a:sysClr val="windowText" lastClr="000000"/>
+                  </a:solidFill>
+                </a:rPr>
+                <a:t>reading 16L8!</a:t>
+              </a:r>
+            </a:p>
+          </p:txBody>
+        </p:sp>
+        <p:sp>
+          <p:nvSpPr>
+            <p:cNvPr id="5" name="Left Brace 4">
+              <a:extLst>
+                <a:ext uri="{FF2B5EF4-FFF2-40B4-BE49-F238E27FC236}">
+                  <a16:creationId xmlns:a16="http://schemas.microsoft.com/office/drawing/2014/main" id="{577358CA-54FE-4C99-5C35-60026EB969E4}"/>
+                </a:ext>
+              </a:extLst>
+            </p:cNvPr>
+            <p:cNvSpPr/>
+            <p:nvPr/>
+          </p:nvSpPr>
+          <p:spPr>
+            <a:xfrm>
+              <a:off x="1136072" y="2770909"/>
+              <a:ext cx="535709" cy="2281382"/>
+            </a:xfrm>
+            <a:prstGeom prst="leftBrace">
+              <a:avLst/>
+            </a:prstGeom>
+            <a:ln w="12700">
+              <a:solidFill>
+                <a:schemeClr val="tx1"/>
+              </a:solidFill>
+            </a:ln>
+          </p:spPr>
+          <p:style>
+            <a:lnRef idx="1">
+              <a:schemeClr val="accent1"/>
+            </a:lnRef>
+            <a:fillRef idx="0">
+              <a:schemeClr val="accent1"/>
+            </a:fillRef>
+            <a:effectRef idx="0">
+              <a:schemeClr val="accent1"/>
+            </a:effectRef>
+            <a:fontRef idx="minor">
+              <a:schemeClr val="tx1"/>
+            </a:fontRef>
+          </p:style>
+          <p:txBody>
+            <a:bodyPr rtlCol="0" anchor="ctr"/>
+            <a:lstStyle/>
+            <a:p>
+              <a:pPr algn="ctr"/>
+              <a:endParaRPr lang="en-SI"/>
+            </a:p>
+          </p:txBody>
+        </p:sp>
+      </p:grpSp>
+    </p:spTree>
+    <p:extLst>
+      <p:ext uri="{BB962C8B-B14F-4D97-AF65-F5344CB8AC3E}">
+        <p14:creationId xmlns:p14="http://schemas.microsoft.com/office/powerpoint/2010/main" val="4069530118"/>
+      </p:ext>
+    </p:extLst>
+  </p:cSld>
+  <p:clrMapOvr>
+    <a:masterClrMapping/>
+  </p:clrMapOvr>
+  <p:timing>
+    <p:tnLst>
+      <p:par>
+        <p:cTn id="1" dur="indefinite" restart="never" nodeType="tmRoot">
+          <p:childTnLst>
+            <p:seq concurrent="1" nextAc="seek">
+              <p:cTn id="2" dur="indefinite" nodeType="mainSeq">
+                <p:childTnLst>
+                  <p:par>
+                    <p:cTn id="3" fill="hold">
+                      <p:stCondLst>
+                        <p:cond delay="indefinite"/>
+                      </p:stCondLst>
+                      <p:childTnLst>
+                        <p:par>
+                          <p:cTn id="4" fill="hold">
+                            <p:stCondLst>
+                              <p:cond delay="0"/>
+                            </p:stCondLst>
+                            <p:childTnLst>
+                              <p:par>
+                                <p:cTn id="5" presetID="1" presetClass="entr" presetSubtype="0" fill="hold" nodeType="clickEffect">
+                                  <p:stCondLst>
+                                    <p:cond delay="0"/>
+                                  </p:stCondLst>
+                                  <p:childTnLst>
+                                    <p:set>
+                                      <p:cBhvr>
+                                        <p:cTn id="6" dur="1" fill="hold">
+                                          <p:stCondLst>
+                                            <p:cond delay="0"/>
+                                          </p:stCondLst>
+                                        </p:cTn>
+                                        <p:tgtEl>
+                                          <p:spTgt spid="7"/>
+                                        </p:tgtEl>
+                                        <p:attrNameLst>
+                                          <p:attrName>style.visibility</p:attrName>
+                                        </p:attrNameLst>
+                                      </p:cBhvr>
+                                      <p:to>
+                                        <p:strVal val="visible"/>
+                                      </p:to>
+                                    </p:set>
+                                  </p:childTnLst>
+                                </p:cTn>
+                              </p:par>
+                            </p:childTnLst>
+                          </p:cTn>
+                        </p:par>
+                      </p:childTnLst>
+                    </p:cTn>
+                  </p:par>
+                </p:childTnLst>
+              </p:cTn>
+              <p:prevCondLst>
+                <p:cond evt="onPrev" delay="0">
+                  <p:tgtEl>
+                    <p:sldTgt/>
+                  </p:tgtEl>
+                </p:cond>
+              </p:prevCondLst>
+              <p:nextCondLst>
+                <p:cond evt="onNext" delay="0">
+                  <p:tgtEl>
+                    <p:sldTgt/>
+                  </p:tgtEl>
+                </p:cond>
+              </p:nextCondLst>
+            </p:seq>
+          </p:childTnLst>
+        </p:cTn>
+      </p:par>
+    </p:tnLst>
+  </p:timing>
+</p:sld>
+</file>
+
+<file path=ppt/slides/slide8.xml><?xml version="1.0" encoding="utf-8"?>
+<p:sld xmlns:a="http://schemas.openxmlformats.org/drawingml/2006/main" xmlns:r="http://schemas.openxmlformats.org/officeDocument/2006/relationships" xmlns:p="http://schemas.openxmlformats.org/presentationml/2006/main">
+  <p:cSld>
+    <p:spTree>
+      <p:nvGrpSpPr>
+        <p:cNvPr id="1" name="">
+          <a:extLst>
+            <a:ext uri="{FF2B5EF4-FFF2-40B4-BE49-F238E27FC236}">
+              <a16:creationId xmlns:a16="http://schemas.microsoft.com/office/drawing/2014/main" id="{CF3B24E1-6621-DB98-1042-5FECAC9A38B6}"/>
+            </a:ext>
+          </a:extLst>
+        </p:cNvPr>
+        <p:cNvGrpSpPr/>
+        <p:nvPr/>
+      </p:nvGrpSpPr>
+      <p:grpSpPr>
+        <a:xfrm>
+          <a:off x="0" y="0"/>
+          <a:ext cx="0" cy="0"/>
+          <a:chOff x="0" y="0"/>
+          <a:chExt cx="0" cy="0"/>
+        </a:xfrm>
+      </p:grpSpPr>
+      <p:pic>
+        <p:nvPicPr>
+          <p:cNvPr id="6" name="Picture 5">
+            <a:extLst>
+              <a:ext uri="{FF2B5EF4-FFF2-40B4-BE49-F238E27FC236}">
+                <a16:creationId xmlns:a16="http://schemas.microsoft.com/office/drawing/2014/main" id="{0BBB81A0-988B-DD1D-1884-D8F59E844F2C}"/>
+              </a:ext>
+            </a:extLst>
+          </p:cNvPr>
+          <p:cNvPicPr>
+            <a:picLocks noChangeAspect="1"/>
+          </p:cNvPicPr>
+          <p:nvPr/>
+        </p:nvPicPr>
+        <p:blipFill>
+          <a:blip r:embed="rId2"/>
+          <a:stretch>
+            <a:fillRect/>
+          </a:stretch>
+        </p:blipFill>
+        <p:spPr>
+          <a:xfrm>
+            <a:off x="6698372" y="-1"/>
+            <a:ext cx="5493628" cy="6858000"/>
+          </a:xfrm>
+          <a:prstGeom prst="rect">
+            <a:avLst/>
+          </a:prstGeom>
+        </p:spPr>
+      </p:pic>
+      <p:sp>
+        <p:nvSpPr>
+          <p:cNvPr id="2" name="Title 1">
+            <a:extLst>
+              <a:ext uri="{FF2B5EF4-FFF2-40B4-BE49-F238E27FC236}">
+                <a16:creationId xmlns:a16="http://schemas.microsoft.com/office/drawing/2014/main" id="{38D11DD5-5433-669D-1EB0-ADA5D40CF173}"/>
+              </a:ext>
+            </a:extLst>
+          </p:cNvPr>
+          <p:cNvSpPr>
+            <a:spLocks noGrp="1"/>
+          </p:cNvSpPr>
+          <p:nvPr>
+            <p:ph type="title"/>
+          </p:nvPr>
+        </p:nvSpPr>
+        <p:spPr/>
+        <p:txBody>
+          <a:bodyPr/>
+          <a:lstStyle/>
+          <a:p>
+            <a:r>
+              <a:rPr lang="en-US" dirty="0"/>
+              <a:t>Reading PAL 16R4</a:t>
+            </a:r>
+            <a:endParaRPr lang="en-SI" dirty="0"/>
+          </a:p>
+        </p:txBody>
+      </p:sp>
+      <p:sp>
+        <p:nvSpPr>
+          <p:cNvPr id="3" name="Content Placeholder 2">
+            <a:extLst>
+              <a:ext uri="{FF2B5EF4-FFF2-40B4-BE49-F238E27FC236}">
+                <a16:creationId xmlns:a16="http://schemas.microsoft.com/office/drawing/2014/main" id="{F4518B7B-ED8C-9B6F-7798-6259252C2FD9}"/>
+              </a:ext>
+            </a:extLst>
+          </p:cNvPr>
+          <p:cNvSpPr>
+            <a:spLocks noGrp="1"/>
+          </p:cNvSpPr>
+          <p:nvPr>
+            <p:ph idx="1"/>
+          </p:nvPr>
+        </p:nvSpPr>
+        <p:spPr>
+          <a:xfrm>
+            <a:off x="838200" y="1825624"/>
+            <a:ext cx="6016167" cy="5032375"/>
+          </a:xfrm>
+        </p:spPr>
+        <p:txBody>
+          <a:bodyPr>
+            <a:normAutofit fontScale="92500" lnSpcReduction="10000"/>
+          </a:bodyPr>
+          <a:lstStyle/>
+          <a:p>
+            <a:r>
+              <a:rPr lang="en-US" dirty="0"/>
+              <a:t>Main program</a:t>
+            </a:r>
+          </a:p>
+          <a:p>
+            <a:pPr lvl="1"/>
+            <a:r>
+              <a:rPr lang="en-US" dirty="0"/>
+              <a:t>Set inputs to 0, fire clock pulse, read the initial state (state = register outputs)</a:t>
+            </a:r>
+          </a:p>
+          <a:p>
+            <a:pPr lvl="1"/>
+            <a:r>
+              <a:rPr lang="en-US" dirty="0"/>
+              <a:t>Node = </a:t>
+            </a:r>
+            <a:r>
+              <a:rPr lang="en-US" dirty="0" err="1"/>
+              <a:t>get_or_create_node</a:t>
+            </a:r>
+            <a:r>
+              <a:rPr lang="en-US" dirty="0"/>
+              <a:t>(</a:t>
+            </a:r>
+            <a:r>
+              <a:rPr lang="en-US" dirty="0" err="1"/>
+              <a:t>initial_state</a:t>
+            </a:r>
+            <a:r>
+              <a:rPr lang="en-US" dirty="0"/>
+              <a:t>)</a:t>
+            </a:r>
+          </a:p>
+          <a:p>
+            <a:pPr lvl="1"/>
+            <a:r>
+              <a:rPr lang="en-US" dirty="0"/>
+              <a:t>Main loop</a:t>
+            </a:r>
+          </a:p>
+          <a:p>
+            <a:pPr lvl="2"/>
+            <a:r>
+              <a:rPr lang="en-US" dirty="0" err="1"/>
+              <a:t>Node.inputs.count</a:t>
+            </a:r>
+            <a:r>
+              <a:rPr lang="en-US" dirty="0"/>
+              <a:t>() &gt; 0:</a:t>
+            </a:r>
+          </a:p>
+          <a:p>
+            <a:pPr lvl="3"/>
+            <a:r>
+              <a:rPr lang="en-US" dirty="0"/>
+              <a:t>Inputs = </a:t>
+            </a:r>
+            <a:r>
+              <a:rPr lang="en-US" dirty="0" err="1"/>
+              <a:t>node.inputs.dequeue</a:t>
+            </a:r>
+            <a:r>
+              <a:rPr lang="en-US" dirty="0"/>
+              <a:t>()</a:t>
+            </a:r>
+          </a:p>
+          <a:p>
+            <a:pPr lvl="3"/>
+            <a:r>
+              <a:rPr lang="en-US" dirty="0">
+                <a:solidFill>
+                  <a:srgbClr val="FF0000"/>
+                </a:solidFill>
+              </a:rPr>
+              <a:t>Read outputs with clock pulse *state transition*</a:t>
+            </a:r>
+          </a:p>
+          <a:p>
+            <a:pPr lvl="3"/>
+            <a:r>
+              <a:rPr lang="en-US" dirty="0"/>
+              <a:t>New state = outputs from registers (4 bits)</a:t>
+            </a:r>
+          </a:p>
+          <a:p>
+            <a:pPr lvl="3"/>
+            <a:r>
+              <a:rPr lang="en-US" dirty="0" err="1"/>
+              <a:t>Child_node</a:t>
+            </a:r>
+            <a:r>
+              <a:rPr lang="en-US" dirty="0"/>
+              <a:t> = </a:t>
+            </a:r>
+            <a:r>
+              <a:rPr lang="en-US" dirty="0" err="1"/>
+              <a:t>get_or_create_node</a:t>
+            </a:r>
+            <a:r>
+              <a:rPr lang="en-US" dirty="0"/>
+              <a:t>(new state)</a:t>
+            </a:r>
+          </a:p>
+          <a:p>
+            <a:pPr lvl="3"/>
+            <a:r>
+              <a:rPr lang="en-US" dirty="0" err="1"/>
+              <a:t>Node.outlinks</a:t>
+            </a:r>
+            <a:r>
+              <a:rPr lang="en-US" dirty="0"/>
+              <a:t>[inputs] = </a:t>
+            </a:r>
+            <a:r>
+              <a:rPr lang="en-US" dirty="0" err="1"/>
+              <a:t>child_node</a:t>
+            </a:r>
+            <a:endParaRPr lang="en-US" dirty="0"/>
+          </a:p>
+          <a:p>
+            <a:pPr lvl="3"/>
+            <a:r>
+              <a:rPr lang="en-US" dirty="0"/>
+              <a:t>Node = </a:t>
+            </a:r>
+            <a:r>
+              <a:rPr lang="en-US" dirty="0" err="1"/>
+              <a:t>child_node</a:t>
+            </a:r>
+            <a:r>
+              <a:rPr lang="en-US" dirty="0"/>
+              <a:t> </a:t>
+            </a:r>
+            <a:r>
+              <a:rPr lang="en-US" dirty="0">
+                <a:solidFill>
+                  <a:schemeClr val="bg1">
+                    <a:lumMod val="50000"/>
+                  </a:schemeClr>
+                </a:solidFill>
+              </a:rPr>
+              <a:t>(restart main loop)</a:t>
+            </a:r>
+          </a:p>
+          <a:p>
+            <a:pPr lvl="2"/>
+            <a:r>
+              <a:rPr lang="en-US" dirty="0" err="1"/>
+              <a:t>Node.inputs.count</a:t>
+            </a:r>
+            <a:r>
+              <a:rPr lang="en-US" dirty="0"/>
+              <a:t>() == 0:</a:t>
+            </a:r>
+          </a:p>
+          <a:p>
+            <a:pPr lvl="3"/>
+            <a:r>
+              <a:rPr lang="en-US" dirty="0"/>
+              <a:t>Find path </a:t>
+            </a:r>
+            <a:r>
+              <a:rPr lang="en-US"/>
+              <a:t>to a </a:t>
+            </a:r>
+            <a:r>
+              <a:rPr lang="en-US" dirty="0"/>
+              <a:t>node that still has some unexplored inputs </a:t>
+            </a:r>
+            <a:r>
+              <a:rPr lang="en-US" dirty="0">
+                <a:solidFill>
+                  <a:schemeClr val="bg1">
+                    <a:lumMod val="50000"/>
+                  </a:schemeClr>
+                </a:solidFill>
+              </a:rPr>
+              <a:t>(restart main loop)</a:t>
+            </a:r>
+          </a:p>
+          <a:p>
+            <a:pPr lvl="3"/>
+            <a:r>
+              <a:rPr lang="en-US" dirty="0"/>
+              <a:t>If no such node is found, we are done</a:t>
+            </a:r>
+          </a:p>
+        </p:txBody>
+      </p:sp>
+    </p:spTree>
+    <p:extLst>
+      <p:ext uri="{BB962C8B-B14F-4D97-AF65-F5344CB8AC3E}">
+        <p14:creationId xmlns:p14="http://schemas.microsoft.com/office/powerpoint/2010/main" val="2379125332"/>
+      </p:ext>
+    </p:extLst>
+  </p:cSld>
+  <p:clrMapOvr>
+    <a:masterClrMapping/>
+  </p:clrMapOvr>
+</p:sld>
+</file>
+
+<file path=ppt/slides/slide9.xml><?xml version="1.0" encoding="utf-8"?>
+<p:sld xmlns:a="http://schemas.openxmlformats.org/drawingml/2006/main" xmlns:r="http://schemas.openxmlformats.org/officeDocument/2006/relationships" xmlns:p="http://schemas.openxmlformats.org/presentationml/2006/main">
+  <p:cSld>
+    <p:spTree>
+      <p:nvGrpSpPr>
         <p:cNvPr id="1" name=""/>
         <p:cNvGrpSpPr/>
         <p:nvPr/>
@@ -13530,6 +14887,216 @@
       </p:grpSpPr>
       <p:sp>
         <p:nvSpPr>
+          <p:cNvPr id="13" name="Rectangle 12">
+            <a:extLst>
+              <a:ext uri="{FF2B5EF4-FFF2-40B4-BE49-F238E27FC236}">
+                <a16:creationId xmlns:a16="http://schemas.microsoft.com/office/drawing/2014/main" id="{A91ACEEE-B9B7-35D3-9DA5-5956589CF3EF}"/>
+              </a:ext>
+            </a:extLst>
+          </p:cNvPr>
+          <p:cNvSpPr/>
+          <p:nvPr/>
+        </p:nvSpPr>
+        <p:spPr>
+          <a:xfrm>
+            <a:off x="2244494" y="3458826"/>
+            <a:ext cx="2326878" cy="1824373"/>
+          </a:xfrm>
+          <a:prstGeom prst="rect">
+            <a:avLst/>
+          </a:prstGeom>
+          <a:noFill/>
+          <a:ln w="38100">
+            <a:solidFill>
+              <a:schemeClr val="tx1"/>
+            </a:solidFill>
+          </a:ln>
+        </p:spPr>
+        <p:style>
+          <a:lnRef idx="2">
+            <a:schemeClr val="accent1">
+              <a:shade val="15000"/>
+            </a:schemeClr>
+          </a:lnRef>
+          <a:fillRef idx="1">
+            <a:schemeClr val="accent1"/>
+          </a:fillRef>
+          <a:effectRef idx="0">
+            <a:schemeClr val="accent1"/>
+          </a:effectRef>
+          <a:fontRef idx="minor">
+            <a:schemeClr val="lt1"/>
+          </a:fontRef>
+        </p:style>
+        <p:txBody>
+          <a:bodyPr rtlCol="0" anchor="t"/>
+          <a:lstStyle/>
+          <a:p>
+            <a:r>
+              <a:rPr lang="en-US" dirty="0">
+                <a:solidFill>
+                  <a:schemeClr val="tx1"/>
+                </a:solidFill>
+              </a:rPr>
+              <a:t>Mappings:</a:t>
+            </a:r>
+          </a:p>
+          <a:p>
+            <a:endParaRPr lang="en-US" dirty="0">
+              <a:solidFill>
+                <a:schemeClr val="tx1"/>
+              </a:solidFill>
+            </a:endParaRPr>
+          </a:p>
+          <a:p>
+            <a:r>
+              <a:rPr lang="en-US" dirty="0">
+                <a:solidFill>
+                  <a:schemeClr val="tx1"/>
+                </a:solidFill>
+              </a:rPr>
+              <a:t>Inputs I</a:t>
+            </a:r>
+            <a:r>
+              <a:rPr lang="en-US" baseline="-25000" dirty="0">
+                <a:solidFill>
+                  <a:schemeClr val="tx1"/>
+                </a:solidFill>
+              </a:rPr>
+              <a:t>1</a:t>
+            </a:r>
+            <a:r>
+              <a:rPr lang="en-US" dirty="0">
+                <a:solidFill>
+                  <a:schemeClr val="tx1"/>
+                </a:solidFill>
+              </a:rPr>
+              <a:t> </a:t>
+            </a:r>
+            <a:r>
+              <a:rPr lang="en-US" dirty="0">
+                <a:solidFill>
+                  <a:schemeClr val="tx1"/>
+                </a:solidFill>
+                <a:sym typeface="Wingdings" panose="05000000000000000000" pitchFamily="2" charset="2"/>
+              </a:rPr>
+              <a:t> Outputs O</a:t>
+            </a:r>
+            <a:r>
+              <a:rPr lang="en-US" baseline="-25000" dirty="0">
+                <a:solidFill>
+                  <a:schemeClr val="tx1"/>
+                </a:solidFill>
+                <a:sym typeface="Wingdings" panose="05000000000000000000" pitchFamily="2" charset="2"/>
+              </a:rPr>
+              <a:t>1</a:t>
+            </a:r>
+          </a:p>
+          <a:p>
+            <a:r>
+              <a:rPr lang="en-US" dirty="0">
+                <a:solidFill>
+                  <a:schemeClr val="tx1"/>
+                </a:solidFill>
+                <a:sym typeface="Wingdings" panose="05000000000000000000" pitchFamily="2" charset="2"/>
+              </a:rPr>
+              <a:t>Inputs </a:t>
+            </a:r>
+            <a:r>
+              <a:rPr lang="en-US" dirty="0">
+                <a:solidFill>
+                  <a:schemeClr val="tx1"/>
+                </a:solidFill>
+              </a:rPr>
+              <a:t>I</a:t>
+            </a:r>
+            <a:r>
+              <a:rPr lang="en-US" baseline="-25000" dirty="0">
+                <a:solidFill>
+                  <a:schemeClr val="tx1"/>
+                </a:solidFill>
+              </a:rPr>
+              <a:t>2</a:t>
+            </a:r>
+            <a:r>
+              <a:rPr lang="en-US" dirty="0">
+                <a:solidFill>
+                  <a:schemeClr val="tx1"/>
+                </a:solidFill>
+                <a:sym typeface="Wingdings" panose="05000000000000000000" pitchFamily="2" charset="2"/>
+              </a:rPr>
+              <a:t>  Outputs O</a:t>
+            </a:r>
+            <a:r>
+              <a:rPr lang="en-US" baseline="-25000" dirty="0">
+                <a:solidFill>
+                  <a:schemeClr val="tx1"/>
+                </a:solidFill>
+                <a:sym typeface="Wingdings" panose="05000000000000000000" pitchFamily="2" charset="2"/>
+              </a:rPr>
+              <a:t>2</a:t>
+            </a:r>
+            <a:endParaRPr lang="en-US" dirty="0">
+              <a:solidFill>
+                <a:schemeClr val="tx1"/>
+              </a:solidFill>
+              <a:sym typeface="Wingdings" panose="05000000000000000000" pitchFamily="2" charset="2"/>
+            </a:endParaRPr>
+          </a:p>
+          <a:p>
+            <a:r>
+              <a:rPr lang="en-US" dirty="0">
+                <a:solidFill>
+                  <a:schemeClr val="tx1"/>
+                </a:solidFill>
+                <a:sym typeface="Wingdings" panose="05000000000000000000" pitchFamily="2" charset="2"/>
+              </a:rPr>
+              <a:t>Inputs </a:t>
+            </a:r>
+            <a:r>
+              <a:rPr lang="en-US" dirty="0">
+                <a:solidFill>
+                  <a:schemeClr val="tx1"/>
+                </a:solidFill>
+              </a:rPr>
+              <a:t>I</a:t>
+            </a:r>
+            <a:r>
+              <a:rPr lang="en-US" baseline="-25000" dirty="0">
+                <a:solidFill>
+                  <a:schemeClr val="tx1"/>
+                </a:solidFill>
+              </a:rPr>
+              <a:t>3</a:t>
+            </a:r>
+            <a:r>
+              <a:rPr lang="en-US" dirty="0">
+                <a:solidFill>
+                  <a:schemeClr val="tx1"/>
+                </a:solidFill>
+                <a:sym typeface="Wingdings" panose="05000000000000000000" pitchFamily="2" charset="2"/>
+              </a:rPr>
+              <a:t>  Outputs O</a:t>
+            </a:r>
+            <a:r>
+              <a:rPr lang="en-US" baseline="-25000" dirty="0">
+                <a:solidFill>
+                  <a:schemeClr val="tx1"/>
+                </a:solidFill>
+                <a:sym typeface="Wingdings" panose="05000000000000000000" pitchFamily="2" charset="2"/>
+              </a:rPr>
+              <a:t>3</a:t>
+            </a:r>
+            <a:endParaRPr lang="en-SI" dirty="0">
+              <a:solidFill>
+                <a:schemeClr val="tx1"/>
+              </a:solidFill>
+            </a:endParaRPr>
+          </a:p>
+        </p:txBody>
+      </p:sp>
+      <p:sp>
+        <p:nvSpPr>
           <p:cNvPr id="4" name="Oval 3">
             <a:extLst>
               <a:ext uri="{FF2B5EF4-FFF2-40B4-BE49-F238E27FC236}">
@@ -13542,7 +15109,7 @@
         </p:nvSpPr>
         <p:spPr>
           <a:xfrm>
-            <a:off x="541135" y="1188791"/>
+            <a:off x="4014007" y="2481882"/>
             <a:ext cx="1724394" cy="1260144"/>
           </a:xfrm>
           <a:prstGeom prst="ellipse">
@@ -13584,15 +15151,7 @@
                   <a:schemeClr val="tx1"/>
                 </a:solidFill>
               </a:rPr>
-              <a:t>Outputs O</a:t>
-            </a:r>
-            <a:r>
-              <a:rPr lang="en-US" baseline="-25000" dirty="0">
-                <a:solidFill>
-                  <a:schemeClr val="tx1"/>
-                </a:solidFill>
-              </a:rPr>
-              <a:t>1</a:t>
+              <a:t>Node A</a:t>
             </a:r>
             <a:endParaRPr lang="LID4096" baseline="-25000" dirty="0">
               <a:solidFill>
@@ -13616,7 +15175,7 @@
         </p:nvSpPr>
         <p:spPr>
           <a:xfrm>
-            <a:off x="3477678" y="244821"/>
+            <a:off x="6950550" y="1537912"/>
             <a:ext cx="1724394" cy="1260144"/>
           </a:xfrm>
           <a:prstGeom prst="ellipse">
@@ -13658,15 +15217,7 @@
                   <a:schemeClr val="tx1"/>
                 </a:solidFill>
               </a:rPr>
-              <a:t>Outputs O</a:t>
-            </a:r>
-            <a:r>
-              <a:rPr lang="en-US" baseline="-25000" dirty="0">
-                <a:solidFill>
-                  <a:schemeClr val="tx1"/>
-                </a:solidFill>
-              </a:rPr>
-              <a:t>2</a:t>
+              <a:t>Node B</a:t>
             </a:r>
             <a:endParaRPr lang="LID4096" baseline="-25000" dirty="0">
               <a:solidFill>
@@ -13690,7 +15241,7 @@
         </p:nvSpPr>
         <p:spPr>
           <a:xfrm>
-            <a:off x="3477678" y="2132761"/>
+            <a:off x="6950550" y="3425852"/>
             <a:ext cx="1724394" cy="1260144"/>
           </a:xfrm>
           <a:prstGeom prst="ellipse">
@@ -13699,7 +15250,7 @@
           <a:solidFill>
             <a:schemeClr val="bg1"/>
           </a:solidFill>
-          <a:ln>
+          <a:ln w="38100">
             <a:solidFill>
               <a:schemeClr val="tx1"/>
             </a:solidFill>
@@ -13732,15 +15283,7 @@
                   <a:schemeClr val="tx1"/>
                 </a:solidFill>
               </a:rPr>
-              <a:t>Outputs O</a:t>
-            </a:r>
-            <a:r>
-              <a:rPr lang="en-US" baseline="-25000" dirty="0">
-                <a:solidFill>
-                  <a:schemeClr val="tx1"/>
-                </a:solidFill>
-              </a:rPr>
-              <a:t>3</a:t>
+              <a:t>Node C</a:t>
             </a:r>
             <a:endParaRPr lang="LID4096" baseline="-25000" dirty="0">
               <a:solidFill>
@@ -13768,7 +15311,7 @@
         </p:nvCxnSpPr>
         <p:spPr>
           <a:xfrm flipV="1">
-            <a:off x="2012997" y="874893"/>
+            <a:off x="5485869" y="2167984"/>
             <a:ext cx="1464681" cy="498442"/>
           </a:xfrm>
           <a:prstGeom prst="straightConnector1">
@@ -13814,7 +15357,7 @@
         </p:nvCxnSpPr>
         <p:spPr>
           <a:xfrm>
-            <a:off x="2012997" y="2264391"/>
+            <a:off x="5485869" y="3557482"/>
             <a:ext cx="1464681" cy="498442"/>
           </a:xfrm>
           <a:prstGeom prst="straightConnector1">
@@ -13856,8 +15399,8 @@
         </p:nvSpPr>
         <p:spPr>
           <a:xfrm>
-            <a:off x="1969827" y="819459"/>
-            <a:ext cx="1187355" cy="369332"/>
+            <a:off x="5534897" y="2112550"/>
+            <a:ext cx="1187355" cy="646331"/>
           </a:xfrm>
           <a:prstGeom prst="rect">
             <a:avLst/>
@@ -13870,15 +15413,66 @@
           </a:bodyPr>
           <a:lstStyle/>
           <a:p>
+            <a:pPr algn="ctr"/>
             <a:r>
               <a:rPr lang="en-US" dirty="0">
                 <a:solidFill>
                   <a:schemeClr val="tx1"/>
                 </a:solidFill>
+                <a:highlight>
+                  <a:srgbClr val="FFFF00"/>
+                </a:highlight>
               </a:rPr>
               <a:t>Inputs I</a:t>
             </a:r>
-            <a:endParaRPr lang="LID4096" dirty="0"/>
+            <a:r>
+              <a:rPr lang="en-US" baseline="-25000" dirty="0">
+                <a:solidFill>
+                  <a:schemeClr val="tx1"/>
+                </a:solidFill>
+                <a:highlight>
+                  <a:srgbClr val="FFFF00"/>
+                </a:highlight>
+              </a:rPr>
+              <a:t>1</a:t>
+            </a:r>
+            <a:r>
+              <a:rPr lang="en-US" dirty="0">
+                <a:solidFill>
+                  <a:schemeClr val="tx1"/>
+                </a:solidFill>
+                <a:highlight>
+                  <a:srgbClr val="FFFF00"/>
+                </a:highlight>
+              </a:rPr>
+              <a:t> +</a:t>
+            </a:r>
+            <a:br>
+              <a:rPr lang="en-US" dirty="0">
+                <a:solidFill>
+                  <a:schemeClr val="tx1"/>
+                </a:solidFill>
+                <a:highlight>
+                  <a:srgbClr val="FFFF00"/>
+                </a:highlight>
+              </a:rPr>
+            </a:br>
+            <a:r>
+              <a:rPr lang="en-US" dirty="0">
+                <a:solidFill>
+                  <a:schemeClr val="tx1"/>
+                </a:solidFill>
+                <a:highlight>
+                  <a:srgbClr val="FFFF00"/>
+                </a:highlight>
+              </a:rPr>
+              <a:t>clock</a:t>
+            </a:r>
+            <a:endParaRPr lang="LID4096" dirty="0">
+              <a:highlight>
+                <a:srgbClr val="FFFF00"/>
+              </a:highlight>
+            </a:endParaRPr>
           </a:p>
         </p:txBody>
       </p:sp>
@@ -13896,7 +15490,7 @@
         </p:nvSpPr>
         <p:spPr>
           <a:xfrm>
-            <a:off x="1969827" y="2448935"/>
+            <a:off x="5534897" y="3557481"/>
             <a:ext cx="1187355" cy="646331"/>
           </a:xfrm>
           <a:prstGeom prst="rect">
@@ -13910,19 +15504,48 @@
           </a:bodyPr>
           <a:lstStyle/>
           <a:p>
+            <a:pPr algn="ctr"/>
             <a:r>
               <a:rPr lang="en-US" dirty="0">
                 <a:solidFill>
                   <a:schemeClr val="tx1"/>
                 </a:solidFill>
+                <a:highlight>
+                  <a:srgbClr val="FFFF00"/>
+                </a:highlight>
               </a:rPr>
               <a:t>Inputs I</a:t>
+            </a:r>
+            <a:r>
+              <a:rPr lang="en-US" baseline="-25000" dirty="0">
+                <a:solidFill>
+                  <a:schemeClr val="tx1"/>
+                </a:solidFill>
+                <a:highlight>
+                  <a:srgbClr val="FFFF00"/>
+                </a:highlight>
+              </a:rPr>
+              <a:t>2</a:t>
+            </a:r>
+            <a:r>
+              <a:rPr lang="en-US" dirty="0">
+                <a:solidFill>
+                  <a:schemeClr val="tx1"/>
+                </a:solidFill>
+                <a:highlight>
+                  <a:srgbClr val="FFFF00"/>
+                </a:highlight>
+              </a:rPr>
+              <a:t> +</a:t>
             </a:r>
             <a:br>
               <a:rPr lang="en-US" dirty="0">
                 <a:solidFill>
                   <a:schemeClr val="tx1"/>
                 </a:solidFill>
+                <a:highlight>
+                  <a:srgbClr val="FFFF00"/>
+                </a:highlight>
               </a:rPr>
             </a:br>
             <a:r>
@@ -13930,422 +15553,45 @@
                 <a:solidFill>
                   <a:schemeClr val="tx1"/>
                 </a:solidFill>
+                <a:highlight>
+                  <a:srgbClr val="FFFF00"/>
+                </a:highlight>
               </a:rPr>
-              <a:t>+ Clock</a:t>
-            </a:r>
-            <a:endParaRPr lang="LID4096" dirty="0"/>
+              <a:t>clock</a:t>
+            </a:r>
+            <a:endParaRPr lang="LID4096" dirty="0">
+              <a:highlight>
+                <a:srgbClr val="FFFF00"/>
+              </a:highlight>
+            </a:endParaRPr>
           </a:p>
         </p:txBody>
       </p:sp>
       <p:cxnSp>
         <p:nvCxnSpPr>
-          <p:cNvPr id="17" name="Straight Arrow Connector 16">
+          <p:cNvPr id="3" name="Connector: Curved 2">
             <a:extLst>
               <a:ext uri="{FF2B5EF4-FFF2-40B4-BE49-F238E27FC236}">
-                <a16:creationId xmlns:a16="http://schemas.microsoft.com/office/drawing/2014/main" id="{A3442BB5-5492-9527-7B11-D2226DDE112A}"/>
+                <a16:creationId xmlns:a16="http://schemas.microsoft.com/office/drawing/2014/main" id="{70DFC11C-08A9-8EBB-D8FD-FBC7FEF8E7B3}"/>
               </a:ext>
             </a:extLst>
           </p:cNvPr>
           <p:cNvCxnSpPr>
             <a:cxnSpLocks/>
-            <a:stCxn id="5" idx="4"/>
-            <a:endCxn id="6" idx="0"/>
+            <a:stCxn id="4" idx="4"/>
+            <a:endCxn id="6" idx="3"/>
           </p:cNvCxnSpPr>
           <p:nvPr/>
         </p:nvCxnSpPr>
         <p:spPr>
-          <a:xfrm>
-            <a:off x="4339875" y="1504965"/>
-            <a:ext cx="0" cy="627796"/>
+          <a:xfrm rot="16200000" flipH="1">
+            <a:off x="5659930" y="2958300"/>
+            <a:ext cx="759426" cy="2326878"/>
           </a:xfrm>
-          <a:prstGeom prst="straightConnector1">
-            <a:avLst/>
-          </a:prstGeom>
-          <a:ln w="38100">
-            <a:solidFill>
-              <a:schemeClr val="tx1"/>
-            </a:solidFill>
-            <a:prstDash val="sysDash"/>
-            <a:tailEnd type="triangle"/>
-          </a:ln>
-        </p:spPr>
-        <p:style>
-          <a:lnRef idx="1">
-            <a:schemeClr val="accent1"/>
-          </a:lnRef>
-          <a:fillRef idx="0">
-            <a:schemeClr val="accent1"/>
-          </a:fillRef>
-          <a:effectRef idx="0">
-            <a:schemeClr val="accent1"/>
-          </a:effectRef>
-          <a:fontRef idx="minor">
-            <a:schemeClr val="tx1"/>
-          </a:fontRef>
-        </p:style>
-      </p:cxnSp>
-      <p:sp>
-        <p:nvSpPr>
-          <p:cNvPr id="20" name="TextBox 19">
-            <a:extLst>
-              <a:ext uri="{FF2B5EF4-FFF2-40B4-BE49-F238E27FC236}">
-                <a16:creationId xmlns:a16="http://schemas.microsoft.com/office/drawing/2014/main" id="{7FA169D7-88E4-E55C-1E62-B3D09D923CBB}"/>
-              </a:ext>
-            </a:extLst>
-          </p:cNvPr>
-          <p:cNvSpPr txBox="1"/>
-          <p:nvPr/>
-        </p:nvSpPr>
-        <p:spPr>
-          <a:xfrm>
-            <a:off x="4387755" y="1495698"/>
-            <a:ext cx="1187355" cy="646331"/>
-          </a:xfrm>
-          <a:prstGeom prst="rect">
-            <a:avLst/>
-          </a:prstGeom>
-          <a:noFill/>
-        </p:spPr>
-        <p:txBody>
-          <a:bodyPr wrap="square">
-            <a:spAutoFit/>
-          </a:bodyPr>
-          <a:lstStyle/>
-          <a:p>
-            <a:r>
-              <a:rPr lang="en-US" dirty="0">
-                <a:solidFill>
-                  <a:schemeClr val="tx1"/>
-                </a:solidFill>
-              </a:rPr>
-              <a:t>Inputs I</a:t>
-            </a:r>
-            <a:br>
-              <a:rPr lang="en-US" dirty="0">
-                <a:solidFill>
-                  <a:schemeClr val="tx1"/>
-                </a:solidFill>
-              </a:rPr>
-            </a:br>
-            <a:r>
-              <a:rPr lang="en-US" dirty="0">
-                <a:solidFill>
-                  <a:schemeClr val="tx1"/>
-                </a:solidFill>
-              </a:rPr>
-              <a:t>+ Clock</a:t>
-            </a:r>
-          </a:p>
-        </p:txBody>
-      </p:sp>
-      <p:cxnSp>
-        <p:nvCxnSpPr>
-          <p:cNvPr id="22" name="Connector: Curved 21">
-            <a:extLst>
-              <a:ext uri="{FF2B5EF4-FFF2-40B4-BE49-F238E27FC236}">
-                <a16:creationId xmlns:a16="http://schemas.microsoft.com/office/drawing/2014/main" id="{304F9AC2-C609-0AD3-5D22-020A6F082359}"/>
-              </a:ext>
-            </a:extLst>
-          </p:cNvPr>
-          <p:cNvCxnSpPr>
-            <a:cxnSpLocks/>
-            <a:stCxn id="5" idx="5"/>
-            <a:endCxn id="5" idx="7"/>
-          </p:cNvCxnSpPr>
-          <p:nvPr/>
-        </p:nvCxnSpPr>
-        <p:spPr>
-          <a:xfrm rot="5400000" flipH="1">
-            <a:off x="4504012" y="874893"/>
-            <a:ext cx="891056" cy="12700"/>
-          </a:xfrm>
-          <a:prstGeom prst="curvedConnector5">
+          <a:prstGeom prst="curvedConnector3">
             <a:avLst>
-              <a:gd name="adj1" fmla="val -25655"/>
-              <a:gd name="adj2" fmla="val -10432457"/>
-              <a:gd name="adj3" fmla="val 125655"/>
+              <a:gd name="adj1" fmla="val 130077"/>
             </a:avLst>
-          </a:prstGeom>
-          <a:ln w="38100">
-            <a:solidFill>
-              <a:schemeClr val="tx1"/>
-            </a:solidFill>
-            <a:prstDash val="sysDash"/>
-            <a:tailEnd type="triangle"/>
-          </a:ln>
-        </p:spPr>
-        <p:style>
-          <a:lnRef idx="1">
-            <a:schemeClr val="accent1"/>
-          </a:lnRef>
-          <a:fillRef idx="0">
-            <a:schemeClr val="accent1"/>
-          </a:fillRef>
-          <a:effectRef idx="0">
-            <a:schemeClr val="accent1"/>
-          </a:effectRef>
-          <a:fontRef idx="minor">
-            <a:schemeClr val="tx1"/>
-          </a:fontRef>
-        </p:style>
-      </p:cxnSp>
-      <p:sp>
-        <p:nvSpPr>
-          <p:cNvPr id="26" name="TextBox 25">
-            <a:extLst>
-              <a:ext uri="{FF2B5EF4-FFF2-40B4-BE49-F238E27FC236}">
-                <a16:creationId xmlns:a16="http://schemas.microsoft.com/office/drawing/2014/main" id="{E2FAC1A9-A2E0-6320-CDCF-92D6CB0A06D3}"/>
-              </a:ext>
-            </a:extLst>
-          </p:cNvPr>
-          <p:cNvSpPr txBox="1"/>
-          <p:nvPr/>
-        </p:nvSpPr>
-        <p:spPr>
-          <a:xfrm>
-            <a:off x="5356747" y="685594"/>
-            <a:ext cx="1187355" cy="369332"/>
-          </a:xfrm>
-          <a:prstGeom prst="rect">
-            <a:avLst/>
-          </a:prstGeom>
-          <a:noFill/>
-        </p:spPr>
-        <p:txBody>
-          <a:bodyPr wrap="square">
-            <a:spAutoFit/>
-          </a:bodyPr>
-          <a:lstStyle/>
-          <a:p>
-            <a:r>
-              <a:rPr lang="en-US" dirty="0">
-                <a:solidFill>
-                  <a:schemeClr val="tx1"/>
-                </a:solidFill>
-              </a:rPr>
-              <a:t>Inputs I</a:t>
-            </a:r>
-            <a:endParaRPr lang="LID4096" dirty="0"/>
-          </a:p>
-        </p:txBody>
-      </p:sp>
-      <p:sp>
-        <p:nvSpPr>
-          <p:cNvPr id="27" name="Oval 26">
-            <a:extLst>
-              <a:ext uri="{FF2B5EF4-FFF2-40B4-BE49-F238E27FC236}">
-                <a16:creationId xmlns:a16="http://schemas.microsoft.com/office/drawing/2014/main" id="{707262EA-BEF2-003B-B63C-5FEDF301BEF4}"/>
-              </a:ext>
-            </a:extLst>
-          </p:cNvPr>
-          <p:cNvSpPr/>
-          <p:nvPr/>
-        </p:nvSpPr>
-        <p:spPr>
-          <a:xfrm>
-            <a:off x="4085229" y="4409065"/>
-            <a:ext cx="1724394" cy="1260144"/>
-          </a:xfrm>
-          <a:prstGeom prst="ellipse">
-            <a:avLst/>
-          </a:prstGeom>
-          <a:solidFill>
-            <a:schemeClr val="bg1"/>
-          </a:solidFill>
-          <a:ln w="38100">
-            <a:solidFill>
-              <a:schemeClr val="tx1"/>
-            </a:solidFill>
-          </a:ln>
-        </p:spPr>
-        <p:style>
-          <a:lnRef idx="2">
-            <a:schemeClr val="accent1">
-              <a:shade val="15000"/>
-            </a:schemeClr>
-          </a:lnRef>
-          <a:fillRef idx="1">
-            <a:schemeClr val="accent1"/>
-          </a:fillRef>
-          <a:effectRef idx="0">
-            <a:schemeClr val="accent1"/>
-          </a:effectRef>
-          <a:fontRef idx="minor">
-            <a:schemeClr val="lt1"/>
-          </a:fontRef>
-        </p:style>
-        <p:txBody>
-          <a:bodyPr rtlCol="0" anchor="ctr"/>
-          <a:lstStyle/>
-          <a:p>
-            <a:pPr algn="ctr"/>
-            <a:r>
-              <a:rPr lang="en-US" dirty="0">
-                <a:solidFill>
-                  <a:schemeClr val="tx1"/>
-                </a:solidFill>
-              </a:rPr>
-              <a:t>Outputs O</a:t>
-            </a:r>
-            <a:r>
-              <a:rPr lang="en-US" baseline="-25000" dirty="0">
-                <a:solidFill>
-                  <a:schemeClr val="tx1"/>
-                </a:solidFill>
-              </a:rPr>
-              <a:t>1</a:t>
-            </a:r>
-            <a:endParaRPr lang="LID4096" baseline="-25000" dirty="0">
-              <a:solidFill>
-                <a:schemeClr val="tx1"/>
-              </a:solidFill>
-            </a:endParaRPr>
-          </a:p>
-        </p:txBody>
-      </p:sp>
-      <p:sp>
-        <p:nvSpPr>
-          <p:cNvPr id="30" name="Oval 29">
-            <a:extLst>
-              <a:ext uri="{FF2B5EF4-FFF2-40B4-BE49-F238E27FC236}">
-                <a16:creationId xmlns:a16="http://schemas.microsoft.com/office/drawing/2014/main" id="{38EF77C5-4ADF-97E6-686C-874FC8E2008A}"/>
-              </a:ext>
-            </a:extLst>
-          </p:cNvPr>
-          <p:cNvSpPr/>
-          <p:nvPr/>
-        </p:nvSpPr>
-        <p:spPr>
-          <a:xfrm>
-            <a:off x="7021772" y="5353035"/>
-            <a:ext cx="1724394" cy="1260144"/>
-          </a:xfrm>
-          <a:prstGeom prst="ellipse">
-            <a:avLst/>
-          </a:prstGeom>
-          <a:solidFill>
-            <a:schemeClr val="bg1"/>
-          </a:solidFill>
-          <a:ln>
-            <a:solidFill>
-              <a:schemeClr val="tx1"/>
-            </a:solidFill>
-          </a:ln>
-        </p:spPr>
-        <p:style>
-          <a:lnRef idx="2">
-            <a:schemeClr val="accent1">
-              <a:shade val="15000"/>
-            </a:schemeClr>
-          </a:lnRef>
-          <a:fillRef idx="1">
-            <a:schemeClr val="accent1"/>
-          </a:fillRef>
-          <a:effectRef idx="0">
-            <a:schemeClr val="accent1"/>
-          </a:effectRef>
-          <a:fontRef idx="minor">
-            <a:schemeClr val="lt1"/>
-          </a:fontRef>
-        </p:style>
-        <p:txBody>
-          <a:bodyPr rtlCol="0" anchor="ctr"/>
-          <a:lstStyle/>
-          <a:p>
-            <a:pPr algn="ctr"/>
-            <a:r>
-              <a:rPr lang="en-US" dirty="0">
-                <a:solidFill>
-                  <a:schemeClr val="tx1"/>
-                </a:solidFill>
-              </a:rPr>
-              <a:t>Outputs O</a:t>
-            </a:r>
-            <a:r>
-              <a:rPr lang="en-US" baseline="-25000" dirty="0">
-                <a:solidFill>
-                  <a:schemeClr val="tx1"/>
-                </a:solidFill>
-              </a:rPr>
-              <a:t>3</a:t>
-            </a:r>
-            <a:endParaRPr lang="LID4096" baseline="-25000" dirty="0">
-              <a:solidFill>
-                <a:schemeClr val="tx1"/>
-              </a:solidFill>
-            </a:endParaRPr>
-          </a:p>
-        </p:txBody>
-      </p:sp>
-      <p:cxnSp>
-        <p:nvCxnSpPr>
-          <p:cNvPr id="31" name="Straight Arrow Connector 30">
-            <a:extLst>
-              <a:ext uri="{FF2B5EF4-FFF2-40B4-BE49-F238E27FC236}">
-                <a16:creationId xmlns:a16="http://schemas.microsoft.com/office/drawing/2014/main" id="{216581F4-B1B9-1CFA-F098-72271973D3C6}"/>
-              </a:ext>
-            </a:extLst>
-          </p:cNvPr>
-          <p:cNvCxnSpPr>
-            <a:cxnSpLocks/>
-            <a:stCxn id="30" idx="6"/>
-            <a:endCxn id="39" idx="3"/>
-          </p:cNvCxnSpPr>
-          <p:nvPr/>
-        </p:nvCxnSpPr>
-        <p:spPr>
-          <a:xfrm flipV="1">
-            <a:off x="8746166" y="5484665"/>
-            <a:ext cx="1464681" cy="498442"/>
-          </a:xfrm>
-          <a:prstGeom prst="straightConnector1">
-            <a:avLst/>
-          </a:prstGeom>
-          <a:ln w="38100">
-            <a:solidFill>
-              <a:schemeClr val="tx1"/>
-            </a:solidFill>
-            <a:tailEnd type="triangle"/>
-          </a:ln>
-        </p:spPr>
-        <p:style>
-          <a:lnRef idx="1">
-            <a:schemeClr val="accent1"/>
-          </a:lnRef>
-          <a:fillRef idx="0">
-            <a:schemeClr val="accent1"/>
-          </a:fillRef>
-          <a:effectRef idx="0">
-            <a:schemeClr val="accent1"/>
-          </a:effectRef>
-          <a:fontRef idx="minor">
-            <a:schemeClr val="tx1"/>
-          </a:fontRef>
-        </p:style>
-      </p:cxnSp>
-      <p:cxnSp>
-        <p:nvCxnSpPr>
-          <p:cNvPr id="32" name="Straight Arrow Connector 31">
-            <a:extLst>
-              <a:ext uri="{FF2B5EF4-FFF2-40B4-BE49-F238E27FC236}">
-                <a16:creationId xmlns:a16="http://schemas.microsoft.com/office/drawing/2014/main" id="{56B0FC5A-078E-CE27-17D7-69148876DAF4}"/>
-              </a:ext>
-            </a:extLst>
-          </p:cNvPr>
-          <p:cNvCxnSpPr>
-            <a:cxnSpLocks/>
-            <a:stCxn id="27" idx="5"/>
-            <a:endCxn id="30" idx="2"/>
-          </p:cNvCxnSpPr>
-          <p:nvPr/>
-        </p:nvCxnSpPr>
-        <p:spPr>
-          <a:xfrm>
-            <a:off x="5557091" y="5484665"/>
-            <a:ext cx="1464681" cy="498442"/>
-          </a:xfrm>
-          <a:prstGeom prst="straightConnector1">
-            <a:avLst/>
           </a:prstGeom>
           <a:ln w="38100">
             <a:solidFill>
@@ -14371,10 +15617,10 @@
       </p:cxnSp>
       <p:sp>
         <p:nvSpPr>
-          <p:cNvPr id="33" name="TextBox 32">
+          <p:cNvPr id="10" name="TextBox 9">
             <a:extLst>
               <a:ext uri="{FF2B5EF4-FFF2-40B4-BE49-F238E27FC236}">
-                <a16:creationId xmlns:a16="http://schemas.microsoft.com/office/drawing/2014/main" id="{70D4EE83-0F86-BA30-A7AF-B4B5D58736D3}"/>
+                <a16:creationId xmlns:a16="http://schemas.microsoft.com/office/drawing/2014/main" id="{2D7B67D1-C35C-5ECF-818A-3B8501C8670E}"/>
               </a:ext>
             </a:extLst>
           </p:cNvPr>
@@ -14383,47 +15629,7 @@
         </p:nvSpPr>
         <p:spPr>
           <a:xfrm>
-            <a:off x="5690270" y="4186179"/>
-            <a:ext cx="1187355" cy="369332"/>
-          </a:xfrm>
-          <a:prstGeom prst="rect">
-            <a:avLst/>
-          </a:prstGeom>
-          <a:noFill/>
-        </p:spPr>
-        <p:txBody>
-          <a:bodyPr wrap="square">
-            <a:spAutoFit/>
-          </a:bodyPr>
-          <a:lstStyle/>
-          <a:p>
-            <a:r>
-              <a:rPr lang="en-US" dirty="0">
-                <a:solidFill>
-                  <a:schemeClr val="tx1"/>
-                </a:solidFill>
-              </a:rPr>
-              <a:t>Inputs I</a:t>
-            </a:r>
-            <a:endParaRPr lang="LID4096" dirty="0"/>
-          </a:p>
-        </p:txBody>
-      </p:sp>
-      <p:sp>
-        <p:nvSpPr>
-          <p:cNvPr id="34" name="TextBox 33">
-            <a:extLst>
-              <a:ext uri="{FF2B5EF4-FFF2-40B4-BE49-F238E27FC236}">
-                <a16:creationId xmlns:a16="http://schemas.microsoft.com/office/drawing/2014/main" id="{BCBE3369-197B-B25B-6E7F-554BB394EC20}"/>
-              </a:ext>
-            </a:extLst>
-          </p:cNvPr>
-          <p:cNvSpPr txBox="1"/>
-          <p:nvPr/>
-        </p:nvSpPr>
-        <p:spPr>
-          <a:xfrm>
-            <a:off x="5513921" y="5669209"/>
+            <a:off x="5534896" y="4434537"/>
             <a:ext cx="1187355" cy="646331"/>
           </a:xfrm>
           <a:prstGeom prst="rect">
@@ -14437,19 +15643,45 @@
           </a:bodyPr>
           <a:lstStyle/>
           <a:p>
+            <a:pPr algn="ctr"/>
             <a:r>
               <a:rPr lang="en-US" dirty="0">
                 <a:solidFill>
                   <a:schemeClr val="tx1"/>
                 </a:solidFill>
+                <a:highlight>
+                  <a:srgbClr val="FFFF00"/>
+                </a:highlight>
               </a:rPr>
               <a:t>Inputs I</a:t>
+            </a:r>
+            <a:r>
+              <a:rPr lang="en-US" baseline="-25000" dirty="0">
+                <a:highlight>
+                  <a:srgbClr val="FFFF00"/>
+                </a:highlight>
+              </a:rPr>
+              <a:t>3</a:t>
+            </a:r>
+            <a:r>
+              <a:rPr lang="en-US" dirty="0">
+                <a:solidFill>
+                  <a:schemeClr val="tx1"/>
+                </a:solidFill>
+                <a:highlight>
+                  <a:srgbClr val="FFFF00"/>
+                </a:highlight>
+              </a:rPr>
+              <a:t> +</a:t>
             </a:r>
             <a:br>
               <a:rPr lang="en-US" dirty="0">
                 <a:solidFill>
                   <a:schemeClr val="tx1"/>
                 </a:solidFill>
+                <a:highlight>
+                  <a:srgbClr val="FFFF00"/>
+                </a:highlight>
               </a:rPr>
             </a:br>
             <a:r>
@@ -14457,187 +15689,54 @@
                 <a:solidFill>
                   <a:schemeClr val="tx1"/>
                 </a:solidFill>
+                <a:highlight>
+                  <a:srgbClr val="FFFF00"/>
+                </a:highlight>
               </a:rPr>
-              <a:t>+ Clock</a:t>
-            </a:r>
-            <a:endParaRPr lang="LID4096" dirty="0"/>
+              <a:t>clock</a:t>
+            </a:r>
+            <a:endParaRPr lang="LID4096" dirty="0">
+              <a:highlight>
+                <a:srgbClr val="FFFF00"/>
+              </a:highlight>
+            </a:endParaRPr>
           </a:p>
         </p:txBody>
       </p:sp>
       <p:sp>
         <p:nvSpPr>
-          <p:cNvPr id="39" name="Oval 38">
+          <p:cNvPr id="11" name="Title 1">
             <a:extLst>
               <a:ext uri="{FF2B5EF4-FFF2-40B4-BE49-F238E27FC236}">
-                <a16:creationId xmlns:a16="http://schemas.microsoft.com/office/drawing/2014/main" id="{FF8AB42E-9EB7-7E17-3A9F-4028647A963F}"/>
+                <a16:creationId xmlns:a16="http://schemas.microsoft.com/office/drawing/2014/main" id="{BFE54546-40A6-5890-AD74-1448196C4438}"/>
               </a:ext>
             </a:extLst>
           </p:cNvPr>
-          <p:cNvSpPr/>
-          <p:nvPr/>
+          <p:cNvSpPr>
+            <a:spLocks noGrp="1"/>
+          </p:cNvSpPr>
+          <p:nvPr>
+            <p:ph type="title"/>
+          </p:nvPr>
         </p:nvSpPr>
         <p:spPr>
           <a:xfrm>
-            <a:off x="9958315" y="4409065"/>
-            <a:ext cx="1724394" cy="1260144"/>
+            <a:off x="838200" y="365125"/>
+            <a:ext cx="10515600" cy="1325563"/>
           </a:xfrm>
-          <a:prstGeom prst="ellipse">
-            <a:avLst/>
-          </a:prstGeom>
-          <a:solidFill>
-            <a:schemeClr val="bg1"/>
-          </a:solidFill>
-          <a:ln>
-            <a:solidFill>
-              <a:schemeClr val="tx1"/>
-            </a:solidFill>
-          </a:ln>
         </p:spPr>
-        <p:style>
-          <a:lnRef idx="2">
-            <a:schemeClr val="accent1">
-              <a:shade val="15000"/>
-            </a:schemeClr>
-          </a:lnRef>
-          <a:fillRef idx="1">
-            <a:schemeClr val="accent1"/>
-          </a:fillRef>
-          <a:effectRef idx="0">
-            <a:schemeClr val="accent1"/>
-          </a:effectRef>
-          <a:fontRef idx="minor">
-            <a:schemeClr val="lt1"/>
-          </a:fontRef>
-        </p:style>
         <p:txBody>
-          <a:bodyPr rtlCol="0" anchor="ctr"/>
+          <a:bodyPr/>
           <a:lstStyle/>
           <a:p>
-            <a:pPr algn="ctr"/>
-            <a:r>
-              <a:rPr lang="en-US" dirty="0">
-                <a:solidFill>
-                  <a:schemeClr val="tx1"/>
-                </a:solidFill>
-              </a:rPr>
-              <a:t>Outputs O</a:t>
-            </a:r>
-            <a:r>
-              <a:rPr lang="en-US" baseline="-25000" dirty="0">
-                <a:solidFill>
-                  <a:schemeClr val="tx1"/>
-                </a:solidFill>
-              </a:rPr>
-              <a:t>4</a:t>
-            </a:r>
+            <a:r>
+              <a:rPr lang="en-US" dirty="0"/>
+              <a:t>Toy Example</a:t>
+            </a:r>
+            <a:endParaRPr lang="en-SI" dirty="0"/>
           </a:p>
         </p:txBody>
       </p:sp>
-      <p:sp>
-        <p:nvSpPr>
-          <p:cNvPr id="43" name="TextBox 42">
-            <a:extLst>
-              <a:ext uri="{FF2B5EF4-FFF2-40B4-BE49-F238E27FC236}">
-                <a16:creationId xmlns:a16="http://schemas.microsoft.com/office/drawing/2014/main" id="{FD0950AA-71A5-6971-A7AB-57FAE1FA705A}"/>
-              </a:ext>
-            </a:extLst>
-          </p:cNvPr>
-          <p:cNvSpPr txBox="1"/>
-          <p:nvPr/>
-        </p:nvSpPr>
-        <p:spPr>
-          <a:xfrm>
-            <a:off x="9328921" y="5669208"/>
-            <a:ext cx="1187355" cy="646331"/>
-          </a:xfrm>
-          <a:prstGeom prst="rect">
-            <a:avLst/>
-          </a:prstGeom>
-          <a:noFill/>
-        </p:spPr>
-        <p:txBody>
-          <a:bodyPr wrap="square">
-            <a:spAutoFit/>
-          </a:bodyPr>
-          <a:lstStyle/>
-          <a:p>
-            <a:r>
-              <a:rPr lang="en-US" dirty="0">
-                <a:solidFill>
-                  <a:schemeClr val="tx1"/>
-                </a:solidFill>
-              </a:rPr>
-              <a:t>Inputs I</a:t>
-            </a:r>
-            <a:br>
-              <a:rPr lang="en-US" dirty="0">
-                <a:solidFill>
-                  <a:schemeClr val="tx1"/>
-                </a:solidFill>
-              </a:rPr>
-            </a:br>
-            <a:r>
-              <a:rPr lang="en-US" dirty="0">
-                <a:solidFill>
-                  <a:schemeClr val="tx1"/>
-                </a:solidFill>
-              </a:rPr>
-              <a:t>+ Clock</a:t>
-            </a:r>
-            <a:endParaRPr lang="LID4096" dirty="0"/>
-          </a:p>
-        </p:txBody>
-      </p:sp>
-      <p:cxnSp>
-        <p:nvCxnSpPr>
-          <p:cNvPr id="44" name="Connector: Curved 43">
-            <a:extLst>
-              <a:ext uri="{FF2B5EF4-FFF2-40B4-BE49-F238E27FC236}">
-                <a16:creationId xmlns:a16="http://schemas.microsoft.com/office/drawing/2014/main" id="{BD48A6C3-526F-E4A0-F551-D1124C4EC70C}"/>
-              </a:ext>
-            </a:extLst>
-          </p:cNvPr>
-          <p:cNvCxnSpPr>
-            <a:cxnSpLocks/>
-            <a:stCxn id="27" idx="6"/>
-            <a:endCxn id="27" idx="7"/>
-          </p:cNvCxnSpPr>
-          <p:nvPr/>
-        </p:nvCxnSpPr>
-        <p:spPr>
-          <a:xfrm flipH="1" flipV="1">
-            <a:off x="5557091" y="4593609"/>
-            <a:ext cx="252532" cy="445528"/>
-          </a:xfrm>
-          <a:prstGeom prst="curvedConnector4">
-            <a:avLst>
-              <a:gd name="adj1" fmla="val -340926"/>
-              <a:gd name="adj2" fmla="val 249912"/>
-            </a:avLst>
-          </a:prstGeom>
-          <a:ln w="38100">
-            <a:solidFill>
-              <a:schemeClr val="tx1"/>
-            </a:solidFill>
-            <a:prstDash val="solid"/>
-            <a:tailEnd type="triangle"/>
-          </a:ln>
-        </p:spPr>
-        <p:style>
-          <a:lnRef idx="1">
-            <a:schemeClr val="accent1"/>
-          </a:lnRef>
-          <a:fillRef idx="0">
-            <a:schemeClr val="accent1"/>
-          </a:fillRef>
-          <a:effectRef idx="0">
-            <a:schemeClr val="accent1"/>
-          </a:effectRef>
-          <a:fontRef idx="minor">
-            <a:schemeClr val="tx1"/>
-          </a:fontRef>
-        </p:style>
-      </p:cxnSp>
     </p:spTree>
     <p:extLst>
       <p:ext uri="{BB962C8B-B14F-4D97-AF65-F5344CB8AC3E}">
@@ -14648,6 +15747,401 @@
   <p:clrMapOvr>
     <a:masterClrMapping/>
   </p:clrMapOvr>
+  <p:timing>
+    <p:tnLst>
+      <p:par>
+        <p:cTn id="1" dur="indefinite" restart="never" nodeType="tmRoot">
+          <p:childTnLst>
+            <p:seq concurrent="1" nextAc="seek">
+              <p:cTn id="2" dur="indefinite" nodeType="mainSeq">
+                <p:childTnLst>
+                  <p:par>
+                    <p:cTn id="3" fill="hold">
+                      <p:stCondLst>
+                        <p:cond delay="indefinite"/>
+                      </p:stCondLst>
+                      <p:childTnLst>
+                        <p:par>
+                          <p:cTn id="4" fill="hold">
+                            <p:stCondLst>
+                              <p:cond delay="0"/>
+                            </p:stCondLst>
+                            <p:childTnLst>
+                              <p:par>
+                                <p:cTn id="5" presetID="1" presetClass="entr" presetSubtype="0" fill="hold" grpId="0" nodeType="clickEffect">
+                                  <p:stCondLst>
+                                    <p:cond delay="0"/>
+                                  </p:stCondLst>
+                                  <p:childTnLst>
+                                    <p:set>
+                                      <p:cBhvr>
+                                        <p:cTn id="6" dur="1" fill="hold">
+                                          <p:stCondLst>
+                                            <p:cond delay="0"/>
+                                          </p:stCondLst>
+                                        </p:cTn>
+                                        <p:tgtEl>
+                                          <p:spTgt spid="13"/>
+                                        </p:tgtEl>
+                                        <p:attrNameLst>
+                                          <p:attrName>style.visibility</p:attrName>
+                                        </p:attrNameLst>
+                                      </p:cBhvr>
+                                      <p:to>
+                                        <p:strVal val="visible"/>
+                                      </p:to>
+                                    </p:set>
+                                  </p:childTnLst>
+                                </p:cTn>
+                              </p:par>
+                            </p:childTnLst>
+                          </p:cTn>
+                        </p:par>
+                      </p:childTnLst>
+                    </p:cTn>
+                  </p:par>
+                  <p:par>
+                    <p:cTn id="7" fill="hold">
+                      <p:stCondLst>
+                        <p:cond delay="indefinite"/>
+                      </p:stCondLst>
+                      <p:childTnLst>
+                        <p:par>
+                          <p:cTn id="8" fill="hold">
+                            <p:stCondLst>
+                              <p:cond delay="0"/>
+                            </p:stCondLst>
+                            <p:childTnLst>
+                              <p:par>
+                                <p:cTn id="9" presetID="1" presetClass="entr" presetSubtype="0" fill="hold" grpId="0" nodeType="clickEffect">
+                                  <p:stCondLst>
+                                    <p:cond delay="0"/>
+                                  </p:stCondLst>
+                                  <p:childTnLst>
+                                    <p:set>
+                                      <p:cBhvr>
+                                        <p:cTn id="10" dur="1" fill="hold">
+                                          <p:stCondLst>
+                                            <p:cond delay="0"/>
+                                          </p:stCondLst>
+                                        </p:cTn>
+                                        <p:tgtEl>
+                                          <p:spTgt spid="15"/>
+                                        </p:tgtEl>
+                                        <p:attrNameLst>
+                                          <p:attrName>style.visibility</p:attrName>
+                                        </p:attrNameLst>
+                                      </p:cBhvr>
+                                      <p:to>
+                                        <p:strVal val="visible"/>
+                                      </p:to>
+                                    </p:set>
+                                  </p:childTnLst>
+                                </p:cTn>
+                              </p:par>
+                              <p:par>
+                                <p:cTn id="11" presetID="22" presetClass="entr" presetSubtype="8" fill="hold" nodeType="withEffect">
+                                  <p:stCondLst>
+                                    <p:cond delay="0"/>
+                                  </p:stCondLst>
+                                  <p:childTnLst>
+                                    <p:set>
+                                      <p:cBhvr>
+                                        <p:cTn id="12" dur="1" fill="hold">
+                                          <p:stCondLst>
+                                            <p:cond delay="0"/>
+                                          </p:stCondLst>
+                                        </p:cTn>
+                                        <p:tgtEl>
+                                          <p:spTgt spid="9"/>
+                                        </p:tgtEl>
+                                        <p:attrNameLst>
+                                          <p:attrName>style.visibility</p:attrName>
+                                        </p:attrNameLst>
+                                      </p:cBhvr>
+                                      <p:to>
+                                        <p:strVal val="visible"/>
+                                      </p:to>
+                                    </p:set>
+                                    <p:animEffect transition="in" filter="wipe(left)">
+                                      <p:cBhvr>
+                                        <p:cTn id="13" dur="500"/>
+                                        <p:tgtEl>
+                                          <p:spTgt spid="9"/>
+                                        </p:tgtEl>
+                                      </p:cBhvr>
+                                    </p:animEffect>
+                                  </p:childTnLst>
+                                </p:cTn>
+                              </p:par>
+                            </p:childTnLst>
+                          </p:cTn>
+                        </p:par>
+                        <p:par>
+                          <p:cTn id="14" fill="hold">
+                            <p:stCondLst>
+                              <p:cond delay="500"/>
+                            </p:stCondLst>
+                            <p:childTnLst>
+                              <p:par>
+                                <p:cTn id="15" presetID="1" presetClass="entr" presetSubtype="0" fill="hold" grpId="0" nodeType="afterEffect">
+                                  <p:stCondLst>
+                                    <p:cond delay="0"/>
+                                  </p:stCondLst>
+                                  <p:childTnLst>
+                                    <p:set>
+                                      <p:cBhvr>
+                                        <p:cTn id="16" dur="1" fill="hold">
+                                          <p:stCondLst>
+                                            <p:cond delay="0"/>
+                                          </p:stCondLst>
+                                        </p:cTn>
+                                        <p:tgtEl>
+                                          <p:spTgt spid="5"/>
+                                        </p:tgtEl>
+                                        <p:attrNameLst>
+                                          <p:attrName>style.visibility</p:attrName>
+                                        </p:attrNameLst>
+                                      </p:cBhvr>
+                                      <p:to>
+                                        <p:strVal val="visible"/>
+                                      </p:to>
+                                    </p:set>
+                                  </p:childTnLst>
+                                </p:cTn>
+                              </p:par>
+                            </p:childTnLst>
+                          </p:cTn>
+                        </p:par>
+                      </p:childTnLst>
+                    </p:cTn>
+                  </p:par>
+                  <p:par>
+                    <p:cTn id="17" fill="hold">
+                      <p:stCondLst>
+                        <p:cond delay="indefinite"/>
+                      </p:stCondLst>
+                      <p:childTnLst>
+                        <p:par>
+                          <p:cTn id="18" fill="hold">
+                            <p:stCondLst>
+                              <p:cond delay="0"/>
+                            </p:stCondLst>
+                            <p:childTnLst>
+                              <p:par>
+                                <p:cTn id="19" presetID="1" presetClass="entr" presetSubtype="0" fill="hold" grpId="0" nodeType="clickEffect">
+                                  <p:stCondLst>
+                                    <p:cond delay="0"/>
+                                  </p:stCondLst>
+                                  <p:childTnLst>
+                                    <p:set>
+                                      <p:cBhvr>
+                                        <p:cTn id="20" dur="1" fill="hold">
+                                          <p:stCondLst>
+                                            <p:cond delay="0"/>
+                                          </p:stCondLst>
+                                        </p:cTn>
+                                        <p:tgtEl>
+                                          <p:spTgt spid="16"/>
+                                        </p:tgtEl>
+                                        <p:attrNameLst>
+                                          <p:attrName>style.visibility</p:attrName>
+                                        </p:attrNameLst>
+                                      </p:cBhvr>
+                                      <p:to>
+                                        <p:strVal val="visible"/>
+                                      </p:to>
+                                    </p:set>
+                                  </p:childTnLst>
+                                </p:cTn>
+                              </p:par>
+                              <p:par>
+                                <p:cTn id="21" presetID="22" presetClass="entr" presetSubtype="8" fill="hold" nodeType="withEffect">
+                                  <p:stCondLst>
+                                    <p:cond delay="0"/>
+                                  </p:stCondLst>
+                                  <p:childTnLst>
+                                    <p:set>
+                                      <p:cBhvr>
+                                        <p:cTn id="22" dur="1" fill="hold">
+                                          <p:stCondLst>
+                                            <p:cond delay="0"/>
+                                          </p:stCondLst>
+                                        </p:cTn>
+                                        <p:tgtEl>
+                                          <p:spTgt spid="12"/>
+                                        </p:tgtEl>
+                                        <p:attrNameLst>
+                                          <p:attrName>style.visibility</p:attrName>
+                                        </p:attrNameLst>
+                                      </p:cBhvr>
+                                      <p:to>
+                                        <p:strVal val="visible"/>
+                                      </p:to>
+                                    </p:set>
+                                    <p:animEffect transition="in" filter="wipe(left)">
+                                      <p:cBhvr>
+                                        <p:cTn id="23" dur="500"/>
+                                        <p:tgtEl>
+                                          <p:spTgt spid="12"/>
+                                        </p:tgtEl>
+                                      </p:cBhvr>
+                                    </p:animEffect>
+                                  </p:childTnLst>
+                                </p:cTn>
+                              </p:par>
+                            </p:childTnLst>
+                          </p:cTn>
+                        </p:par>
+                        <p:par>
+                          <p:cTn id="24" fill="hold">
+                            <p:stCondLst>
+                              <p:cond delay="500"/>
+                            </p:stCondLst>
+                            <p:childTnLst>
+                              <p:par>
+                                <p:cTn id="25" presetID="1" presetClass="entr" presetSubtype="0" fill="hold" grpId="0" nodeType="afterEffect">
+                                  <p:stCondLst>
+                                    <p:cond delay="0"/>
+                                  </p:stCondLst>
+                                  <p:childTnLst>
+                                    <p:set>
+                                      <p:cBhvr>
+                                        <p:cTn id="26" dur="1" fill="hold">
+                                          <p:stCondLst>
+                                            <p:cond delay="0"/>
+                                          </p:stCondLst>
+                                        </p:cTn>
+                                        <p:tgtEl>
+                                          <p:spTgt spid="6"/>
+                                        </p:tgtEl>
+                                        <p:attrNameLst>
+                                          <p:attrName>style.visibility</p:attrName>
+                                        </p:attrNameLst>
+                                      </p:cBhvr>
+                                      <p:to>
+                                        <p:strVal val="visible"/>
+                                      </p:to>
+                                    </p:set>
+                                  </p:childTnLst>
+                                </p:cTn>
+                              </p:par>
+                            </p:childTnLst>
+                          </p:cTn>
+                        </p:par>
+                      </p:childTnLst>
+                    </p:cTn>
+                  </p:par>
+                  <p:par>
+                    <p:cTn id="27" fill="hold">
+                      <p:stCondLst>
+                        <p:cond delay="indefinite"/>
+                      </p:stCondLst>
+                      <p:childTnLst>
+                        <p:par>
+                          <p:cTn id="28" fill="hold">
+                            <p:stCondLst>
+                              <p:cond delay="0"/>
+                            </p:stCondLst>
+                            <p:childTnLst>
+                              <p:par>
+                                <p:cTn id="29" presetID="1" presetClass="entr" presetSubtype="0" fill="hold" grpId="0" nodeType="clickEffect">
+                                  <p:stCondLst>
+                                    <p:cond delay="0"/>
+                                  </p:stCondLst>
+                                  <p:childTnLst>
+                                    <p:set>
+                                      <p:cBhvr>
+                                        <p:cTn id="30" dur="1" fill="hold">
+                                          <p:stCondLst>
+                                            <p:cond delay="0"/>
+                                          </p:stCondLst>
+                                        </p:cTn>
+                                        <p:tgtEl>
+                                          <p:spTgt spid="10"/>
+                                        </p:tgtEl>
+                                        <p:attrNameLst>
+                                          <p:attrName>style.visibility</p:attrName>
+                                        </p:attrNameLst>
+                                      </p:cBhvr>
+                                      <p:to>
+                                        <p:strVal val="visible"/>
+                                      </p:to>
+                                    </p:set>
+                                  </p:childTnLst>
+                                </p:cTn>
+                              </p:par>
+                              <p:par>
+                                <p:cTn id="31" presetID="22" presetClass="entr" presetSubtype="8" fill="hold" nodeType="withEffect">
+                                  <p:stCondLst>
+                                    <p:cond delay="0"/>
+                                  </p:stCondLst>
+                                  <p:childTnLst>
+                                    <p:set>
+                                      <p:cBhvr>
+                                        <p:cTn id="32" dur="1" fill="hold">
+                                          <p:stCondLst>
+                                            <p:cond delay="0"/>
+                                          </p:stCondLst>
+                                        </p:cTn>
+                                        <p:tgtEl>
+                                          <p:spTgt spid="3"/>
+                                        </p:tgtEl>
+                                        <p:attrNameLst>
+                                          <p:attrName>style.visibility</p:attrName>
+                                        </p:attrNameLst>
+                                      </p:cBhvr>
+                                      <p:to>
+                                        <p:strVal val="visible"/>
+                                      </p:to>
+                                    </p:set>
+                                    <p:animEffect transition="in" filter="wipe(left)">
+                                      <p:cBhvr>
+                                        <p:cTn id="33" dur="500"/>
+                                        <p:tgtEl>
+                                          <p:spTgt spid="3"/>
+                                        </p:tgtEl>
+                                      </p:cBhvr>
+                                    </p:animEffect>
+                                  </p:childTnLst>
+                                </p:cTn>
+                              </p:par>
+                            </p:childTnLst>
+                          </p:cTn>
+                        </p:par>
+                      </p:childTnLst>
+                    </p:cTn>
+                  </p:par>
+                </p:childTnLst>
+              </p:cTn>
+              <p:prevCondLst>
+                <p:cond evt="onPrev" delay="0">
+                  <p:tgtEl>
+                    <p:sldTgt/>
+                  </p:tgtEl>
+                </p:cond>
+              </p:prevCondLst>
+              <p:nextCondLst>
+                <p:cond evt="onNext" delay="0">
+                  <p:tgtEl>
+                    <p:sldTgt/>
+                  </p:tgtEl>
+                </p:cond>
+              </p:nextCondLst>
+            </p:seq>
+          </p:childTnLst>
+        </p:cTn>
+      </p:par>
+    </p:tnLst>
+    <p:bldLst>
+      <p:bldP spid="13" grpId="0" animBg="1"/>
+      <p:bldP spid="5" grpId="0" animBg="1"/>
+      <p:bldP spid="6" grpId="0" animBg="1"/>
+      <p:bldP spid="15" grpId="0"/>
+      <p:bldP spid="16" grpId="0"/>
+      <p:bldP spid="10" grpId="0"/>
+    </p:bldLst>
+  </p:timing>
 </p:sld>
 </file>
 

</xml_diff>